<commit_message>
fim de slider e tarefas
</commit_message>
<xml_diff>
--- a/Análise de dados.pptx
+++ b/Análise de dados.pptx
@@ -4,6 +4,9 @@
   <p:sldMasterIdLst>
     <p:sldMasterId id="2147483648" r:id="rId1"/>
   </p:sldMasterIdLst>
+  <p:notesMasterIdLst>
+    <p:notesMasterId r:id="rId17"/>
+  </p:notesMasterIdLst>
   <p:sldIdLst>
     <p:sldId id="256" r:id="rId2"/>
     <p:sldId id="257" r:id="rId3"/>
@@ -18,6 +21,8 @@
     <p:sldId id="266" r:id="rId12"/>
     <p:sldId id="267" r:id="rId13"/>
     <p:sldId id="268" r:id="rId14"/>
+    <p:sldId id="269" r:id="rId15"/>
+    <p:sldId id="270" r:id="rId16"/>
   </p:sldIdLst>
   <p:sldSz cx="12192000" cy="6858000"/>
   <p:notesSz cx="6858000" cy="9144000"/>
@@ -116,6 +121,14 @@
       </a:defRPr>
     </a:lvl9pPr>
   </p:defaultTextStyle>
+  <p:extLst>
+    <p:ext uri="{EFAFB233-063F-42B5-8137-9DF3F51BA10A}">
+      <p15:sldGuideLst xmlns:p15="http://schemas.microsoft.com/office/powerpoint/2012/main"/>
+    </p:ext>
+    <p:ext uri="{2D200454-40CA-4A62-9FC3-DE9A4176ACB9}">
+      <p15:notesGuideLst xmlns:p15="http://schemas.microsoft.com/office/powerpoint/2012/main"/>
+    </p:ext>
+  </p:extLst>
 </p:presentation>
 </file>
 
@@ -345,11 +358,11 @@
         </c:dLbls>
         <c:gapWidth val="315"/>
         <c:overlap val="-40"/>
-        <c:axId val="554298448"/>
-        <c:axId val="554298056"/>
+        <c:axId val="474092784"/>
+        <c:axId val="474383184"/>
       </c:barChart>
       <c:catAx>
-        <c:axId val="554298448"/>
+        <c:axId val="474092784"/>
         <c:scaling>
           <c:orientation val="minMax"/>
         </c:scaling>
@@ -410,7 +423,7 @@
             <a:endParaRPr lang="pt-BR"/>
           </a:p>
         </c:txPr>
-        <c:crossAx val="554298056"/>
+        <c:crossAx val="474383184"/>
         <c:crosses val="autoZero"/>
         <c:auto val="1"/>
         <c:lblAlgn val="ctr"/>
@@ -418,7 +431,7 @@
         <c:noMultiLvlLbl val="0"/>
       </c:catAx>
       <c:valAx>
-        <c:axId val="554298056"/>
+        <c:axId val="474383184"/>
         <c:scaling>
           <c:orientation val="minMax"/>
         </c:scaling>
@@ -479,7 +492,7 @@
             <a:endParaRPr lang="pt-BR"/>
           </a:p>
         </c:txPr>
-        <c:crossAx val="554298448"/>
+        <c:crossAx val="474092784"/>
         <c:crosses val="autoZero"/>
         <c:crossBetween val="between"/>
       </c:valAx>
@@ -803,11 +816,11 @@
         </c:dLbls>
         <c:gapWidth val="315"/>
         <c:overlap val="-40"/>
-        <c:axId val="583732992"/>
-        <c:axId val="540980776"/>
+        <c:axId val="474383968"/>
+        <c:axId val="474384360"/>
       </c:barChart>
       <c:catAx>
-        <c:axId val="583732992"/>
+        <c:axId val="474383968"/>
         <c:scaling>
           <c:orientation val="minMax"/>
         </c:scaling>
@@ -866,7 +879,7 @@
             <a:endParaRPr lang="pt-BR"/>
           </a:p>
         </c:txPr>
-        <c:crossAx val="540980776"/>
+        <c:crossAx val="474384360"/>
         <c:crosses val="autoZero"/>
         <c:auto val="1"/>
         <c:lblAlgn val="ctr"/>
@@ -874,7 +887,7 @@
         <c:noMultiLvlLbl val="0"/>
       </c:catAx>
       <c:valAx>
-        <c:axId val="540980776"/>
+        <c:axId val="474384360"/>
         <c:scaling>
           <c:orientation val="minMax"/>
         </c:scaling>
@@ -933,7 +946,7 @@
             <a:endParaRPr lang="pt-BR"/>
           </a:p>
         </c:txPr>
-        <c:crossAx val="583732992"/>
+        <c:crossAx val="474383968"/>
         <c:crosses val="autoZero"/>
         <c:crossBetween val="between"/>
       </c:valAx>
@@ -1250,11 +1263,11 @@
           <c:showBubbleSize val="0"/>
         </c:dLbls>
         <c:gapWidth val="315"/>
-        <c:axId val="500958584"/>
-        <c:axId val="500958976"/>
+        <c:axId val="468609848"/>
+        <c:axId val="468610240"/>
       </c:barChart>
       <c:catAx>
-        <c:axId val="500958584"/>
+        <c:axId val="468609848"/>
         <c:scaling>
           <c:orientation val="minMax"/>
         </c:scaling>
@@ -1313,7 +1326,7 @@
             <a:endParaRPr lang="pt-BR"/>
           </a:p>
         </c:txPr>
-        <c:crossAx val="500958976"/>
+        <c:crossAx val="468610240"/>
         <c:crosses val="autoZero"/>
         <c:auto val="1"/>
         <c:lblAlgn val="ctr"/>
@@ -1321,7 +1334,7 @@
         <c:noMultiLvlLbl val="0"/>
       </c:catAx>
       <c:valAx>
-        <c:axId val="500958976"/>
+        <c:axId val="468610240"/>
         <c:scaling>
           <c:orientation val="minMax"/>
         </c:scaling>
@@ -1380,7 +1393,7 @@
             <a:endParaRPr lang="pt-BR"/>
           </a:p>
         </c:txPr>
-        <c:crossAx val="500958584"/>
+        <c:crossAx val="468609848"/>
         <c:crosses val="autoZero"/>
         <c:crossBetween val="between"/>
       </c:valAx>
@@ -1676,11 +1689,11 @@
         </c:dLbls>
         <c:gapWidth val="182"/>
         <c:overlap val="-50"/>
-        <c:axId val="543660312"/>
-        <c:axId val="543660704"/>
+        <c:axId val="471785456"/>
+        <c:axId val="471785848"/>
       </c:barChart>
       <c:catAx>
-        <c:axId val="543660312"/>
+        <c:axId val="471785456"/>
         <c:scaling>
           <c:orientation val="minMax"/>
         </c:scaling>
@@ -1741,7 +1754,7 @@
             <a:endParaRPr lang="pt-BR"/>
           </a:p>
         </c:txPr>
-        <c:crossAx val="543660704"/>
+        <c:crossAx val="471785848"/>
         <c:crosses val="autoZero"/>
         <c:auto val="1"/>
         <c:lblAlgn val="ctr"/>
@@ -1749,7 +1762,7 @@
         <c:noMultiLvlLbl val="0"/>
       </c:catAx>
       <c:valAx>
-        <c:axId val="543660704"/>
+        <c:axId val="471785848"/>
         <c:scaling>
           <c:orientation val="minMax"/>
         </c:scaling>
@@ -1810,7 +1823,7 @@
             <a:endParaRPr lang="pt-BR"/>
           </a:p>
         </c:txPr>
-        <c:crossAx val="543660312"/>
+        <c:crossAx val="471785456"/>
         <c:crosses val="autoZero"/>
         <c:crossBetween val="between"/>
       </c:valAx>
@@ -2132,11 +2145,11 @@
           <c:showBubbleSize val="0"/>
         </c:dLbls>
         <c:smooth val="0"/>
-        <c:axId val="593236928"/>
-        <c:axId val="499739848"/>
+        <c:axId val="471786632"/>
+        <c:axId val="471787024"/>
       </c:lineChart>
       <c:catAx>
-        <c:axId val="593236928"/>
+        <c:axId val="471786632"/>
         <c:scaling>
           <c:orientation val="minMax"/>
         </c:scaling>
@@ -2178,7 +2191,7 @@
             <a:endParaRPr lang="pt-BR"/>
           </a:p>
         </c:txPr>
-        <c:crossAx val="499739848"/>
+        <c:crossAx val="471787024"/>
         <c:crosses val="autoZero"/>
         <c:auto val="1"/>
         <c:lblAlgn val="ctr"/>
@@ -2186,7 +2199,7 @@
         <c:noMultiLvlLbl val="0"/>
       </c:catAx>
       <c:valAx>
-        <c:axId val="499739848"/>
+        <c:axId val="471787024"/>
         <c:scaling>
           <c:orientation val="minMax"/>
         </c:scaling>
@@ -2236,7 +2249,7 @@
             <a:endParaRPr lang="pt-BR"/>
           </a:p>
         </c:txPr>
-        <c:crossAx val="593236928"/>
+        <c:crossAx val="471786632"/>
         <c:crosses val="autoZero"/>
         <c:crossBetween val="between"/>
       </c:valAx>
@@ -2349,32 +2362,6 @@
         </a:ln>
         <a:effectLst/>
       </c:spPr>
-      <c:txPr>
-        <a:bodyPr rot="0" spcFirstLastPara="1" vertOverflow="ellipsis" vert="horz" wrap="square" anchor="ctr" anchorCtr="1"/>
-        <a:lstStyle/>
-        <a:p>
-          <a:pPr>
-            <a:defRPr sz="2000" b="1" i="0" u="none" strike="noStrike" kern="1200" spc="100" baseline="0">
-              <a:solidFill>
-                <a:schemeClr val="lt1">
-                  <a:lumMod val="95000"/>
-                </a:schemeClr>
-              </a:solidFill>
-              <a:effectLst>
-                <a:outerShdw blurRad="50800" dist="38100" dir="5400000" algn="t" rotWithShape="0">
-                  <a:prstClr val="black">
-                    <a:alpha val="40000"/>
-                  </a:prstClr>
-                </a:outerShdw>
-              </a:effectLst>
-              <a:latin typeface="+mn-lt"/>
-              <a:ea typeface="+mn-ea"/>
-              <a:cs typeface="+mn-cs"/>
-            </a:defRPr>
-          </a:pPr>
-          <a:endParaRPr lang="pt-BR"/>
-        </a:p>
-      </c:txPr>
     </c:title>
     <c:autoTitleDeleted val="0"/>
     <c:plotArea>
@@ -2556,10 +2543,6 @@
                   <a:prstGeom prst="wedgeRectCallout">
                     <a:avLst/>
                   </a:prstGeom>
-                  <a:noFill/>
-                  <a:ln>
-                    <a:noFill/>
-                  </a:ln>
                 </c15:spPr>
                 <c15:layout/>
               </c:ext>
@@ -2857,7 +2840,7 @@
       <a:endParaRPr lang="pt-BR"/>
     </a:p>
   </c:txPr>
-  <c:externalData r:id="rId3">
+  <c:externalData r:id="rId1">
     <c:autoUpdate val="0"/>
   </c:externalData>
 </c:chartSpace>
@@ -3352,11 +3335,11 @@
         </c:dLbls>
         <c:gapWidth val="100"/>
         <c:overlap val="-24"/>
-        <c:axId val="500702088"/>
-        <c:axId val="500700520"/>
+        <c:axId val="469297968"/>
+        <c:axId val="475371272"/>
       </c:barChart>
       <c:catAx>
-        <c:axId val="500702088"/>
+        <c:axId val="469297968"/>
         <c:scaling>
           <c:orientation val="minMax"/>
         </c:scaling>
@@ -3398,7 +3381,7 @@
             <a:endParaRPr lang="pt-BR"/>
           </a:p>
         </c:txPr>
-        <c:crossAx val="500700520"/>
+        <c:crossAx val="475371272"/>
         <c:crosses val="autoZero"/>
         <c:auto val="1"/>
         <c:lblAlgn val="ctr"/>
@@ -3406,7 +3389,7 @@
         <c:noMultiLvlLbl val="0"/>
       </c:catAx>
       <c:valAx>
-        <c:axId val="500700520"/>
+        <c:axId val="475371272"/>
         <c:scaling>
           <c:orientation val="minMax"/>
         </c:scaling>
@@ -3456,7 +3439,7 @@
             <a:endParaRPr lang="pt-BR"/>
           </a:p>
         </c:txPr>
-        <c:crossAx val="500702088"/>
+        <c:crossAx val="469297968"/>
         <c:crosses val="autoZero"/>
         <c:crossBetween val="between"/>
       </c:valAx>
@@ -3746,46 +3729,6 @@
 </file>
 
 <file path=ppt/charts/colors6.xml><?xml version="1.0" encoding="utf-8"?>
-<cs:colorStyle xmlns:cs="http://schemas.microsoft.com/office/drawing/2012/chartStyle" xmlns:a="http://schemas.openxmlformats.org/drawingml/2006/main" meth="cycle" id="10">
-  <a:schemeClr val="accent1"/>
-  <a:schemeClr val="accent2"/>
-  <a:schemeClr val="accent3"/>
-  <a:schemeClr val="accent4"/>
-  <a:schemeClr val="accent5"/>
-  <a:schemeClr val="accent6"/>
-  <cs:variation/>
-  <cs:variation>
-    <a:lumMod val="60000"/>
-  </cs:variation>
-  <cs:variation>
-    <a:lumMod val="80000"/>
-    <a:lumOff val="20000"/>
-  </cs:variation>
-  <cs:variation>
-    <a:lumMod val="80000"/>
-  </cs:variation>
-  <cs:variation>
-    <a:lumMod val="60000"/>
-    <a:lumOff val="40000"/>
-  </cs:variation>
-  <cs:variation>
-    <a:lumMod val="50000"/>
-  </cs:variation>
-  <cs:variation>
-    <a:lumMod val="70000"/>
-    <a:lumOff val="30000"/>
-  </cs:variation>
-  <cs:variation>
-    <a:lumMod val="70000"/>
-  </cs:variation>
-  <cs:variation>
-    <a:lumMod val="50000"/>
-    <a:lumOff val="50000"/>
-  </cs:variation>
-</cs:colorStyle>
-</file>
-
-<file path=ppt/charts/colors7.xml><?xml version="1.0" encoding="utf-8"?>
 <cs:colorStyle xmlns:cs="http://schemas.microsoft.com/office/drawing/2012/chartStyle" xmlns:a="http://schemas.openxmlformats.org/drawingml/2006/main" meth="cycle" id="10">
   <a:schemeClr val="accent1"/>
   <a:schemeClr val="accent2"/>
@@ -6519,502 +6462,6 @@
 </file>
 
 <file path=ppt/charts/style6.xml><?xml version="1.0" encoding="utf-8"?>
-<cs:chartStyle xmlns:cs="http://schemas.microsoft.com/office/drawing/2012/chartStyle" xmlns:a="http://schemas.openxmlformats.org/drawingml/2006/main" id="257">
-  <cs:axisTitle>
-    <cs:lnRef idx="0"/>
-    <cs:fillRef idx="0"/>
-    <cs:effectRef idx="0"/>
-    <cs:fontRef idx="minor">
-      <a:schemeClr val="lt1">
-        <a:lumMod val="85000"/>
-      </a:schemeClr>
-    </cs:fontRef>
-    <cs:defRPr sz="900" b="1" kern="1200" cap="all"/>
-  </cs:axisTitle>
-  <cs:categoryAxis>
-    <cs:lnRef idx="0"/>
-    <cs:fillRef idx="0"/>
-    <cs:effectRef idx="0"/>
-    <cs:fontRef idx="minor">
-      <a:schemeClr val="lt1">
-        <a:lumMod val="85000"/>
-      </a:schemeClr>
-    </cs:fontRef>
-    <cs:spPr>
-      <a:ln w="12700" cap="flat" cmpd="sng" algn="ctr">
-        <a:solidFill>
-          <a:schemeClr val="lt1">
-            <a:lumMod val="95000"/>
-            <a:alpha val="54000"/>
-          </a:schemeClr>
-        </a:solidFill>
-        <a:round/>
-      </a:ln>
-    </cs:spPr>
-    <cs:defRPr sz="900" kern="1200"/>
-  </cs:categoryAxis>
-  <cs:chartArea>
-    <cs:lnRef idx="0"/>
-    <cs:fillRef idx="0"/>
-    <cs:effectRef idx="0"/>
-    <cs:fontRef idx="minor">
-      <a:schemeClr val="dk1"/>
-    </cs:fontRef>
-    <cs:spPr>
-      <a:gradFill flip="none" rotWithShape="1">
-        <a:gsLst>
-          <a:gs pos="0">
-            <a:schemeClr val="dk1">
-              <a:lumMod val="65000"/>
-              <a:lumOff val="35000"/>
-            </a:schemeClr>
-          </a:gs>
-          <a:gs pos="100000">
-            <a:schemeClr val="dk1">
-              <a:lumMod val="85000"/>
-              <a:lumOff val="15000"/>
-            </a:schemeClr>
-          </a:gs>
-        </a:gsLst>
-        <a:path path="circle">
-          <a:fillToRect l="50000" t="50000" r="50000" b="50000"/>
-        </a:path>
-        <a:tileRect/>
-      </a:gradFill>
-    </cs:spPr>
-    <cs:defRPr sz="1000" kern="1200"/>
-  </cs:chartArea>
-  <cs:dataLabel>
-    <cs:lnRef idx="0"/>
-    <cs:fillRef idx="0"/>
-    <cs:effectRef idx="0"/>
-    <cs:fontRef idx="minor">
-      <a:schemeClr val="lt1">
-        <a:lumMod val="85000"/>
-      </a:schemeClr>
-    </cs:fontRef>
-    <cs:defRPr sz="900" kern="1200"/>
-  </cs:dataLabel>
-  <cs:dataLabelCallout>
-    <cs:lnRef idx="0"/>
-    <cs:fillRef idx="0"/>
-    <cs:effectRef idx="0"/>
-    <cs:fontRef idx="minor">
-      <a:schemeClr val="dk1">
-        <a:lumMod val="65000"/>
-        <a:lumOff val="35000"/>
-      </a:schemeClr>
-    </cs:fontRef>
-    <cs:spPr>
-      <a:solidFill>
-        <a:schemeClr val="lt1"/>
-      </a:solidFill>
-    </cs:spPr>
-    <cs:defRPr sz="900" kern="1200"/>
-    <cs:bodyPr rot="0" spcFirstLastPara="1" vertOverflow="clip" horzOverflow="clip" vert="horz" wrap="square" lIns="36576" tIns="18288" rIns="36576" bIns="18288" anchor="ctr" anchorCtr="1">
-      <a:spAutoFit/>
-    </cs:bodyPr>
-  </cs:dataLabelCallout>
-  <cs:dataPoint>
-    <cs:lnRef idx="0"/>
-    <cs:fillRef idx="3">
-      <cs:styleClr val="auto"/>
-    </cs:fillRef>
-    <cs:effectRef idx="3"/>
-    <cs:fontRef idx="minor">
-      <a:schemeClr val="tx1"/>
-    </cs:fontRef>
-  </cs:dataPoint>
-  <cs:dataPoint3D>
-    <cs:lnRef idx="0"/>
-    <cs:fillRef idx="3">
-      <cs:styleClr val="auto"/>
-    </cs:fillRef>
-    <cs:effectRef idx="3"/>
-    <cs:fontRef idx="minor">
-      <a:schemeClr val="tx1"/>
-    </cs:fontRef>
-  </cs:dataPoint3D>
-  <cs:dataPointLine>
-    <cs:lnRef idx="0">
-      <cs:styleClr val="auto"/>
-    </cs:lnRef>
-    <cs:fillRef idx="3"/>
-    <cs:effectRef idx="3"/>
-    <cs:fontRef idx="minor">
-      <a:schemeClr val="tx1"/>
-    </cs:fontRef>
-    <cs:spPr>
-      <a:ln w="34925" cap="rnd">
-        <a:solidFill>
-          <a:schemeClr val="phClr"/>
-        </a:solidFill>
-        <a:round/>
-      </a:ln>
-    </cs:spPr>
-  </cs:dataPointLine>
-  <cs:dataPointMarker>
-    <cs:lnRef idx="0">
-      <cs:styleClr val="auto"/>
-    </cs:lnRef>
-    <cs:fillRef idx="3">
-      <cs:styleClr val="auto"/>
-    </cs:fillRef>
-    <cs:effectRef idx="3"/>
-    <cs:fontRef idx="minor">
-      <a:schemeClr val="tx1"/>
-    </cs:fontRef>
-    <cs:spPr>
-      <a:ln w="9525">
-        <a:solidFill>
-          <a:schemeClr val="phClr"/>
-        </a:solidFill>
-        <a:round/>
-      </a:ln>
-    </cs:spPr>
-  </cs:dataPointMarker>
-  <cs:dataPointMarkerLayout symbol="circle" size="6"/>
-  <cs:dataPointWireframe>
-    <cs:lnRef idx="0">
-      <cs:styleClr val="auto"/>
-    </cs:lnRef>
-    <cs:fillRef idx="3"/>
-    <cs:effectRef idx="3"/>
-    <cs:fontRef idx="minor">
-      <a:schemeClr val="tx1"/>
-    </cs:fontRef>
-    <cs:spPr>
-      <a:ln w="9525" cap="rnd">
-        <a:solidFill>
-          <a:schemeClr val="phClr"/>
-        </a:solidFill>
-        <a:round/>
-      </a:ln>
-    </cs:spPr>
-  </cs:dataPointWireframe>
-  <cs:dataTable>
-    <cs:lnRef idx="0"/>
-    <cs:fillRef idx="0"/>
-    <cs:effectRef idx="0"/>
-    <cs:fontRef idx="minor">
-      <a:schemeClr val="lt1">
-        <a:lumMod val="85000"/>
-      </a:schemeClr>
-    </cs:fontRef>
-    <cs:spPr>
-      <a:ln w="9525">
-        <a:solidFill>
-          <a:schemeClr val="lt1">
-            <a:lumMod val="95000"/>
-            <a:alpha val="54000"/>
-          </a:schemeClr>
-        </a:solidFill>
-      </a:ln>
-    </cs:spPr>
-    <cs:defRPr sz="900" kern="1200"/>
-  </cs:dataTable>
-  <cs:downBar>
-    <cs:lnRef idx="0"/>
-    <cs:fillRef idx="0"/>
-    <cs:effectRef idx="0"/>
-    <cs:fontRef idx="minor">
-      <a:schemeClr val="tx1"/>
-    </cs:fontRef>
-    <cs:spPr>
-      <a:solidFill>
-        <a:schemeClr val="dk1">
-          <a:lumMod val="75000"/>
-          <a:lumOff val="25000"/>
-        </a:schemeClr>
-      </a:solidFill>
-      <a:ln w="9525">
-        <a:solidFill>
-          <a:schemeClr val="lt1">
-            <a:lumMod val="95000"/>
-            <a:alpha val="54000"/>
-          </a:schemeClr>
-        </a:solidFill>
-      </a:ln>
-    </cs:spPr>
-  </cs:downBar>
-  <cs:dropLine>
-    <cs:lnRef idx="0"/>
-    <cs:fillRef idx="0"/>
-    <cs:effectRef idx="0"/>
-    <cs:fontRef idx="minor">
-      <a:schemeClr val="tx1"/>
-    </cs:fontRef>
-    <cs:spPr>
-      <a:ln w="9525">
-        <a:solidFill>
-          <a:schemeClr val="lt1">
-            <a:lumMod val="95000"/>
-            <a:alpha val="54000"/>
-          </a:schemeClr>
-        </a:solidFill>
-        <a:prstDash val="dash"/>
-      </a:ln>
-    </cs:spPr>
-  </cs:dropLine>
-  <cs:errorBar>
-    <cs:lnRef idx="0"/>
-    <cs:fillRef idx="0"/>
-    <cs:effectRef idx="0"/>
-    <cs:fontRef idx="minor">
-      <a:schemeClr val="tx1"/>
-    </cs:fontRef>
-    <cs:spPr>
-      <a:ln w="9525" cap="flat" cmpd="sng" algn="ctr">
-        <a:solidFill>
-          <a:schemeClr val="lt1">
-            <a:lumMod val="95000"/>
-          </a:schemeClr>
-        </a:solidFill>
-        <a:round/>
-      </a:ln>
-    </cs:spPr>
-  </cs:errorBar>
-  <cs:floor>
-    <cs:lnRef idx="0"/>
-    <cs:fillRef idx="0"/>
-    <cs:effectRef idx="0"/>
-    <cs:fontRef idx="minor">
-      <a:schemeClr val="tx1"/>
-    </cs:fontRef>
-  </cs:floor>
-  <cs:gridlineMajor>
-    <cs:lnRef idx="0"/>
-    <cs:fillRef idx="0"/>
-    <cs:effectRef idx="0"/>
-    <cs:fontRef idx="minor">
-      <a:schemeClr val="tx1"/>
-    </cs:fontRef>
-    <cs:spPr>
-      <a:ln w="9525" cap="flat" cmpd="sng" algn="ctr">
-        <a:solidFill>
-          <a:schemeClr val="lt1">
-            <a:lumMod val="95000"/>
-            <a:alpha val="10000"/>
-          </a:schemeClr>
-        </a:solidFill>
-        <a:round/>
-      </a:ln>
-    </cs:spPr>
-  </cs:gridlineMajor>
-  <cs:gridlineMinor>
-    <cs:lnRef idx="0"/>
-    <cs:fillRef idx="0"/>
-    <cs:effectRef idx="0"/>
-    <cs:fontRef idx="minor">
-      <a:schemeClr val="tx1"/>
-    </cs:fontRef>
-    <cs:spPr>
-      <a:ln>
-        <a:solidFill>
-          <a:schemeClr val="lt1">
-            <a:lumMod val="95000"/>
-            <a:alpha val="5000"/>
-          </a:schemeClr>
-        </a:solidFill>
-      </a:ln>
-    </cs:spPr>
-  </cs:gridlineMinor>
-  <cs:hiLoLine>
-    <cs:lnRef idx="0"/>
-    <cs:fillRef idx="0"/>
-    <cs:effectRef idx="0"/>
-    <cs:fontRef idx="minor">
-      <a:schemeClr val="tx1"/>
-    </cs:fontRef>
-    <cs:spPr>
-      <a:ln w="9525">
-        <a:solidFill>
-          <a:schemeClr val="lt1">
-            <a:lumMod val="95000"/>
-            <a:alpha val="54000"/>
-          </a:schemeClr>
-        </a:solidFill>
-        <a:prstDash val="dash"/>
-      </a:ln>
-    </cs:spPr>
-  </cs:hiLoLine>
-  <cs:leaderLine>
-    <cs:lnRef idx="0"/>
-    <cs:fillRef idx="0"/>
-    <cs:effectRef idx="0"/>
-    <cs:fontRef idx="minor">
-      <a:schemeClr val="tx1"/>
-    </cs:fontRef>
-    <cs:spPr>
-      <a:ln w="9525">
-        <a:solidFill>
-          <a:schemeClr val="lt1">
-            <a:lumMod val="95000"/>
-            <a:alpha val="54000"/>
-          </a:schemeClr>
-        </a:solidFill>
-      </a:ln>
-    </cs:spPr>
-  </cs:leaderLine>
-  <cs:legend>
-    <cs:lnRef idx="0"/>
-    <cs:fillRef idx="0"/>
-    <cs:effectRef idx="0"/>
-    <cs:fontRef idx="minor">
-      <a:schemeClr val="lt1">
-        <a:lumMod val="85000"/>
-      </a:schemeClr>
-    </cs:fontRef>
-    <cs:defRPr sz="900" kern="1200"/>
-  </cs:legend>
-  <cs:plotArea>
-    <cs:lnRef idx="0"/>
-    <cs:fillRef idx="0"/>
-    <cs:effectRef idx="0"/>
-    <cs:fontRef idx="minor">
-      <a:schemeClr val="tx1"/>
-    </cs:fontRef>
-  </cs:plotArea>
-  <cs:plotArea3D>
-    <cs:lnRef idx="0"/>
-    <cs:fillRef idx="0"/>
-    <cs:effectRef idx="0"/>
-    <cs:fontRef idx="minor">
-      <a:schemeClr val="tx1"/>
-    </cs:fontRef>
-  </cs:plotArea3D>
-  <cs:seriesAxis>
-    <cs:lnRef idx="0"/>
-    <cs:fillRef idx="0"/>
-    <cs:effectRef idx="0"/>
-    <cs:fontRef idx="minor">
-      <a:schemeClr val="lt1">
-        <a:lumMod val="85000"/>
-      </a:schemeClr>
-    </cs:fontRef>
-    <cs:spPr>
-      <a:ln w="12700" cap="flat" cmpd="sng" algn="ctr">
-        <a:solidFill>
-          <a:schemeClr val="lt1">
-            <a:lumMod val="95000"/>
-            <a:alpha val="54000"/>
-          </a:schemeClr>
-        </a:solidFill>
-        <a:round/>
-      </a:ln>
-    </cs:spPr>
-    <cs:defRPr sz="900" kern="1200"/>
-  </cs:seriesAxis>
-  <cs:seriesLine>
-    <cs:lnRef idx="0"/>
-    <cs:fillRef idx="0"/>
-    <cs:effectRef idx="0"/>
-    <cs:fontRef idx="minor">
-      <a:schemeClr val="lt1"/>
-    </cs:fontRef>
-    <cs:spPr>
-      <a:ln w="9525" cap="flat" cmpd="sng" algn="ctr">
-        <a:solidFill>
-          <a:schemeClr val="lt1">
-            <a:lumMod val="95000"/>
-            <a:alpha val="54000"/>
-          </a:schemeClr>
-        </a:solidFill>
-        <a:round/>
-      </a:ln>
-    </cs:spPr>
-  </cs:seriesLine>
-  <cs:title>
-    <cs:lnRef idx="0"/>
-    <cs:fillRef idx="0"/>
-    <cs:effectRef idx="0"/>
-    <cs:fontRef idx="minor">
-      <a:schemeClr val="lt1">
-        <a:lumMod val="95000"/>
-      </a:schemeClr>
-    </cs:fontRef>
-    <cs:defRPr sz="1600" b="1" kern="1200" spc="100" baseline="0">
-      <a:effectLst>
-        <a:outerShdw blurRad="50800" dist="38100" dir="5400000" algn="t" rotWithShape="0">
-          <a:prstClr val="black">
-            <a:alpha val="40000"/>
-          </a:prstClr>
-        </a:outerShdw>
-      </a:effectLst>
-    </cs:defRPr>
-  </cs:title>
-  <cs:trendline>
-    <cs:lnRef idx="0">
-      <cs:styleClr val="auto"/>
-    </cs:lnRef>
-    <cs:fillRef idx="0"/>
-    <cs:effectRef idx="0"/>
-    <cs:fontRef idx="minor">
-      <a:schemeClr val="tx1"/>
-    </cs:fontRef>
-    <cs:spPr>
-      <a:ln w="19050" cap="rnd">
-        <a:solidFill>
-          <a:schemeClr val="phClr"/>
-        </a:solidFill>
-      </a:ln>
-    </cs:spPr>
-  </cs:trendline>
-  <cs:trendlineLabel>
-    <cs:lnRef idx="0"/>
-    <cs:fillRef idx="0"/>
-    <cs:effectRef idx="0"/>
-    <cs:fontRef idx="minor">
-      <a:schemeClr val="lt1">
-        <a:lumMod val="85000"/>
-      </a:schemeClr>
-    </cs:fontRef>
-    <cs:defRPr sz="900" kern="1200"/>
-  </cs:trendlineLabel>
-  <cs:upBar>
-    <cs:lnRef idx="0"/>
-    <cs:fillRef idx="0"/>
-    <cs:effectRef idx="0"/>
-    <cs:fontRef idx="minor">
-      <a:schemeClr val="tx1"/>
-    </cs:fontRef>
-    <cs:spPr>
-      <a:solidFill>
-        <a:schemeClr val="lt1"/>
-      </a:solidFill>
-      <a:ln w="9525">
-        <a:solidFill>
-          <a:schemeClr val="lt1">
-            <a:lumMod val="95000"/>
-            <a:alpha val="54000"/>
-          </a:schemeClr>
-        </a:solidFill>
-      </a:ln>
-    </cs:spPr>
-  </cs:upBar>
-  <cs:valueAxis>
-    <cs:lnRef idx="0"/>
-    <cs:fillRef idx="0"/>
-    <cs:effectRef idx="0"/>
-    <cs:fontRef idx="minor">
-      <a:schemeClr val="lt1">
-        <a:lumMod val="85000"/>
-      </a:schemeClr>
-    </cs:fontRef>
-    <cs:defRPr sz="900" kern="1200"/>
-  </cs:valueAxis>
-  <cs:wall>
-    <cs:lnRef idx="0"/>
-    <cs:fillRef idx="0"/>
-    <cs:effectRef idx="0"/>
-    <cs:fontRef idx="minor">
-      <a:schemeClr val="tx1"/>
-    </cs:fontRef>
-  </cs:wall>
-</cs:chartStyle>
-</file>
-
-<file path=ppt/charts/style7.xml><?xml version="1.0" encoding="utf-8"?>
 <cs:chartStyle xmlns:cs="http://schemas.microsoft.com/office/drawing/2012/chartStyle" xmlns:a="http://schemas.openxmlformats.org/drawingml/2006/main" id="209">
   <cs:axisTitle>
     <cs:lnRef idx="0"/>
@@ -7510,6 +6957,702 @@
 </cs:chartStyle>
 </file>
 
+<file path=ppt/notesMasters/notesMaster1.xml><?xml version="1.0" encoding="utf-8"?>
+<p:notesMaster xmlns:a="http://schemas.openxmlformats.org/drawingml/2006/main" xmlns:r="http://schemas.openxmlformats.org/officeDocument/2006/relationships" xmlns:p="http://schemas.openxmlformats.org/presentationml/2006/main">
+  <p:cSld>
+    <p:bg>
+      <p:bgRef idx="1001">
+        <a:schemeClr val="bg1"/>
+      </p:bgRef>
+    </p:bg>
+    <p:spTree>
+      <p:nvGrpSpPr>
+        <p:cNvPr id="1" name=""/>
+        <p:cNvGrpSpPr/>
+        <p:nvPr/>
+      </p:nvGrpSpPr>
+      <p:grpSpPr>
+        <a:xfrm>
+          <a:off x="0" y="0"/>
+          <a:ext cx="0" cy="0"/>
+          <a:chOff x="0" y="0"/>
+          <a:chExt cx="0" cy="0"/>
+        </a:xfrm>
+      </p:grpSpPr>
+      <p:sp>
+        <p:nvSpPr>
+          <p:cNvPr id="2" name="Espaço Reservado para Cabeçalho 1"/>
+          <p:cNvSpPr>
+            <a:spLocks noGrp="1"/>
+          </p:cNvSpPr>
+          <p:nvPr>
+            <p:ph type="hdr" sz="quarter"/>
+          </p:nvPr>
+        </p:nvSpPr>
+        <p:spPr>
+          <a:xfrm>
+            <a:off x="0" y="0"/>
+            <a:ext cx="2971800" cy="458788"/>
+          </a:xfrm>
+          <a:prstGeom prst="rect">
+            <a:avLst/>
+          </a:prstGeom>
+        </p:spPr>
+        <p:txBody>
+          <a:bodyPr vert="horz" lIns="91440" tIns="45720" rIns="91440" bIns="45720" rtlCol="0"/>
+          <a:lstStyle>
+            <a:lvl1pPr algn="l">
+              <a:defRPr sz="1200"/>
+            </a:lvl1pPr>
+          </a:lstStyle>
+          <a:p>
+            <a:endParaRPr lang="pt-BR"/>
+          </a:p>
+        </p:txBody>
+      </p:sp>
+      <p:sp>
+        <p:nvSpPr>
+          <p:cNvPr id="3" name="Espaço Reservado para Data 2"/>
+          <p:cNvSpPr>
+            <a:spLocks noGrp="1"/>
+          </p:cNvSpPr>
+          <p:nvPr>
+            <p:ph type="dt" idx="1"/>
+          </p:nvPr>
+        </p:nvSpPr>
+        <p:spPr>
+          <a:xfrm>
+            <a:off x="3884613" y="0"/>
+            <a:ext cx="2971800" cy="458788"/>
+          </a:xfrm>
+          <a:prstGeom prst="rect">
+            <a:avLst/>
+          </a:prstGeom>
+        </p:spPr>
+        <p:txBody>
+          <a:bodyPr vert="horz" lIns="91440" tIns="45720" rIns="91440" bIns="45720" rtlCol="0"/>
+          <a:lstStyle>
+            <a:lvl1pPr algn="r">
+              <a:defRPr sz="1200"/>
+            </a:lvl1pPr>
+          </a:lstStyle>
+          <a:p>
+            <a:fld id="{0C264F88-E271-40DF-B354-6057DE516B0B}" type="datetimeFigureOut">
+              <a:rPr lang="pt-BR" smtClean="0"/>
+              <a:t>30/08/2019</a:t>
+            </a:fld>
+            <a:endParaRPr lang="pt-BR"/>
+          </a:p>
+        </p:txBody>
+      </p:sp>
+      <p:sp>
+        <p:nvSpPr>
+          <p:cNvPr id="4" name="Espaço Reservado para Imagem de Slide 3"/>
+          <p:cNvSpPr>
+            <a:spLocks noGrp="1" noRot="1" noChangeAspect="1"/>
+          </p:cNvSpPr>
+          <p:nvPr>
+            <p:ph type="sldImg" idx="2"/>
+          </p:nvPr>
+        </p:nvSpPr>
+        <p:spPr>
+          <a:xfrm>
+            <a:off x="685800" y="1143000"/>
+            <a:ext cx="5486400" cy="3086100"/>
+          </a:xfrm>
+          <a:prstGeom prst="rect">
+            <a:avLst/>
+          </a:prstGeom>
+          <a:noFill/>
+          <a:ln w="12700">
+            <a:solidFill>
+              <a:prstClr val="black"/>
+            </a:solidFill>
+          </a:ln>
+        </p:spPr>
+        <p:txBody>
+          <a:bodyPr vert="horz" lIns="91440" tIns="45720" rIns="91440" bIns="45720" rtlCol="0" anchor="ctr"/>
+          <a:lstStyle/>
+          <a:p>
+            <a:endParaRPr lang="pt-BR"/>
+          </a:p>
+        </p:txBody>
+      </p:sp>
+      <p:sp>
+        <p:nvSpPr>
+          <p:cNvPr id="5" name="Espaço Reservado para Anotações 4"/>
+          <p:cNvSpPr>
+            <a:spLocks noGrp="1"/>
+          </p:cNvSpPr>
+          <p:nvPr>
+            <p:ph type="body" sz="quarter" idx="3"/>
+          </p:nvPr>
+        </p:nvSpPr>
+        <p:spPr>
+          <a:xfrm>
+            <a:off x="685800" y="4400550"/>
+            <a:ext cx="5486400" cy="3600450"/>
+          </a:xfrm>
+          <a:prstGeom prst="rect">
+            <a:avLst/>
+          </a:prstGeom>
+        </p:spPr>
+        <p:txBody>
+          <a:bodyPr vert="horz" lIns="91440" tIns="45720" rIns="91440" bIns="45720" rtlCol="0"/>
+          <a:lstStyle/>
+          <a:p>
+            <a:pPr lvl="0"/>
+            <a:r>
+              <a:rPr lang="pt-BR" smtClean="0"/>
+              <a:t>Clique para editar o texto mestre</a:t>
+            </a:r>
+          </a:p>
+          <a:p>
+            <a:pPr lvl="1"/>
+            <a:r>
+              <a:rPr lang="pt-BR" smtClean="0"/>
+              <a:t>Segundo nível</a:t>
+            </a:r>
+          </a:p>
+          <a:p>
+            <a:pPr lvl="2"/>
+            <a:r>
+              <a:rPr lang="pt-BR" smtClean="0"/>
+              <a:t>Terceiro nível</a:t>
+            </a:r>
+          </a:p>
+          <a:p>
+            <a:pPr lvl="3"/>
+            <a:r>
+              <a:rPr lang="pt-BR" smtClean="0"/>
+              <a:t>Quarto nível</a:t>
+            </a:r>
+          </a:p>
+          <a:p>
+            <a:pPr lvl="4"/>
+            <a:r>
+              <a:rPr lang="pt-BR" smtClean="0"/>
+              <a:t>Quinto nível</a:t>
+            </a:r>
+            <a:endParaRPr lang="pt-BR"/>
+          </a:p>
+        </p:txBody>
+      </p:sp>
+      <p:sp>
+        <p:nvSpPr>
+          <p:cNvPr id="6" name="Espaço Reservado para Rodapé 5"/>
+          <p:cNvSpPr>
+            <a:spLocks noGrp="1"/>
+          </p:cNvSpPr>
+          <p:nvPr>
+            <p:ph type="ftr" sz="quarter" idx="4"/>
+          </p:nvPr>
+        </p:nvSpPr>
+        <p:spPr>
+          <a:xfrm>
+            <a:off x="0" y="8685213"/>
+            <a:ext cx="2971800" cy="458787"/>
+          </a:xfrm>
+          <a:prstGeom prst="rect">
+            <a:avLst/>
+          </a:prstGeom>
+        </p:spPr>
+        <p:txBody>
+          <a:bodyPr vert="horz" lIns="91440" tIns="45720" rIns="91440" bIns="45720" rtlCol="0" anchor="b"/>
+          <a:lstStyle>
+            <a:lvl1pPr algn="l">
+              <a:defRPr sz="1200"/>
+            </a:lvl1pPr>
+          </a:lstStyle>
+          <a:p>
+            <a:endParaRPr lang="pt-BR"/>
+          </a:p>
+        </p:txBody>
+      </p:sp>
+      <p:sp>
+        <p:nvSpPr>
+          <p:cNvPr id="7" name="Espaço Reservado para Número de Slide 6"/>
+          <p:cNvSpPr>
+            <a:spLocks noGrp="1"/>
+          </p:cNvSpPr>
+          <p:nvPr>
+            <p:ph type="sldNum" sz="quarter" idx="5"/>
+          </p:nvPr>
+        </p:nvSpPr>
+        <p:spPr>
+          <a:xfrm>
+            <a:off x="3884613" y="8685213"/>
+            <a:ext cx="2971800" cy="458787"/>
+          </a:xfrm>
+          <a:prstGeom prst="rect">
+            <a:avLst/>
+          </a:prstGeom>
+        </p:spPr>
+        <p:txBody>
+          <a:bodyPr vert="horz" lIns="91440" tIns="45720" rIns="91440" bIns="45720" rtlCol="0" anchor="b"/>
+          <a:lstStyle>
+            <a:lvl1pPr algn="r">
+              <a:defRPr sz="1200"/>
+            </a:lvl1pPr>
+          </a:lstStyle>
+          <a:p>
+            <a:fld id="{C48F62DC-FC9D-4FCA-9DAA-BAE343AB7EDA}" type="slidenum">
+              <a:rPr lang="pt-BR" smtClean="0"/>
+              <a:t>‹nº›</a:t>
+            </a:fld>
+            <a:endParaRPr lang="pt-BR"/>
+          </a:p>
+        </p:txBody>
+      </p:sp>
+    </p:spTree>
+    <p:extLst>
+      <p:ext uri="{BB962C8B-B14F-4D97-AF65-F5344CB8AC3E}">
+        <p14:creationId xmlns:p14="http://schemas.microsoft.com/office/powerpoint/2010/main" val="886546422"/>
+      </p:ext>
+    </p:extLst>
+  </p:cSld>
+  <p:clrMap bg1="lt1" tx1="dk1" bg2="lt2" tx2="dk2" accent1="accent1" accent2="accent2" accent3="accent3" accent4="accent4" accent5="accent5" accent6="accent6" hlink="hlink" folHlink="folHlink"/>
+  <p:notesStyle>
+    <a:lvl1pPr marL="0" algn="l" defTabSz="914400" rtl="0" eaLnBrk="1" latinLnBrk="0" hangingPunct="1">
+      <a:defRPr sz="1200" kern="1200">
+        <a:solidFill>
+          <a:schemeClr val="tx1"/>
+        </a:solidFill>
+        <a:latin typeface="+mn-lt"/>
+        <a:ea typeface="+mn-ea"/>
+        <a:cs typeface="+mn-cs"/>
+      </a:defRPr>
+    </a:lvl1pPr>
+    <a:lvl2pPr marL="457200" algn="l" defTabSz="914400" rtl="0" eaLnBrk="1" latinLnBrk="0" hangingPunct="1">
+      <a:defRPr sz="1200" kern="1200">
+        <a:solidFill>
+          <a:schemeClr val="tx1"/>
+        </a:solidFill>
+        <a:latin typeface="+mn-lt"/>
+        <a:ea typeface="+mn-ea"/>
+        <a:cs typeface="+mn-cs"/>
+      </a:defRPr>
+    </a:lvl2pPr>
+    <a:lvl3pPr marL="914400" algn="l" defTabSz="914400" rtl="0" eaLnBrk="1" latinLnBrk="0" hangingPunct="1">
+      <a:defRPr sz="1200" kern="1200">
+        <a:solidFill>
+          <a:schemeClr val="tx1"/>
+        </a:solidFill>
+        <a:latin typeface="+mn-lt"/>
+        <a:ea typeface="+mn-ea"/>
+        <a:cs typeface="+mn-cs"/>
+      </a:defRPr>
+    </a:lvl3pPr>
+    <a:lvl4pPr marL="1371600" algn="l" defTabSz="914400" rtl="0" eaLnBrk="1" latinLnBrk="0" hangingPunct="1">
+      <a:defRPr sz="1200" kern="1200">
+        <a:solidFill>
+          <a:schemeClr val="tx1"/>
+        </a:solidFill>
+        <a:latin typeface="+mn-lt"/>
+        <a:ea typeface="+mn-ea"/>
+        <a:cs typeface="+mn-cs"/>
+      </a:defRPr>
+    </a:lvl4pPr>
+    <a:lvl5pPr marL="1828800" algn="l" defTabSz="914400" rtl="0" eaLnBrk="1" latinLnBrk="0" hangingPunct="1">
+      <a:defRPr sz="1200" kern="1200">
+        <a:solidFill>
+          <a:schemeClr val="tx1"/>
+        </a:solidFill>
+        <a:latin typeface="+mn-lt"/>
+        <a:ea typeface="+mn-ea"/>
+        <a:cs typeface="+mn-cs"/>
+      </a:defRPr>
+    </a:lvl5pPr>
+    <a:lvl6pPr marL="2286000" algn="l" defTabSz="914400" rtl="0" eaLnBrk="1" latinLnBrk="0" hangingPunct="1">
+      <a:defRPr sz="1200" kern="1200">
+        <a:solidFill>
+          <a:schemeClr val="tx1"/>
+        </a:solidFill>
+        <a:latin typeface="+mn-lt"/>
+        <a:ea typeface="+mn-ea"/>
+        <a:cs typeface="+mn-cs"/>
+      </a:defRPr>
+    </a:lvl6pPr>
+    <a:lvl7pPr marL="2743200" algn="l" defTabSz="914400" rtl="0" eaLnBrk="1" latinLnBrk="0" hangingPunct="1">
+      <a:defRPr sz="1200" kern="1200">
+        <a:solidFill>
+          <a:schemeClr val="tx1"/>
+        </a:solidFill>
+        <a:latin typeface="+mn-lt"/>
+        <a:ea typeface="+mn-ea"/>
+        <a:cs typeface="+mn-cs"/>
+      </a:defRPr>
+    </a:lvl7pPr>
+    <a:lvl8pPr marL="3200400" algn="l" defTabSz="914400" rtl="0" eaLnBrk="1" latinLnBrk="0" hangingPunct="1">
+      <a:defRPr sz="1200" kern="1200">
+        <a:solidFill>
+          <a:schemeClr val="tx1"/>
+        </a:solidFill>
+        <a:latin typeface="+mn-lt"/>
+        <a:ea typeface="+mn-ea"/>
+        <a:cs typeface="+mn-cs"/>
+      </a:defRPr>
+    </a:lvl8pPr>
+    <a:lvl9pPr marL="3657600" algn="l" defTabSz="914400" rtl="0" eaLnBrk="1" latinLnBrk="0" hangingPunct="1">
+      <a:defRPr sz="1200" kern="1200">
+        <a:solidFill>
+          <a:schemeClr val="tx1"/>
+        </a:solidFill>
+        <a:latin typeface="+mn-lt"/>
+        <a:ea typeface="+mn-ea"/>
+        <a:cs typeface="+mn-cs"/>
+      </a:defRPr>
+    </a:lvl9pPr>
+  </p:notesStyle>
+</p:notesMaster>
+</file>
+
+<file path=ppt/notesSlides/notesSlide1.xml><?xml version="1.0" encoding="utf-8"?>
+<p:notes xmlns:a="http://schemas.openxmlformats.org/drawingml/2006/main" xmlns:r="http://schemas.openxmlformats.org/officeDocument/2006/relationships" xmlns:p="http://schemas.openxmlformats.org/presentationml/2006/main">
+  <p:cSld>
+    <p:spTree>
+      <p:nvGrpSpPr>
+        <p:cNvPr id="1" name=""/>
+        <p:cNvGrpSpPr/>
+        <p:nvPr/>
+      </p:nvGrpSpPr>
+      <p:grpSpPr>
+        <a:xfrm>
+          <a:off x="0" y="0"/>
+          <a:ext cx="0" cy="0"/>
+          <a:chOff x="0" y="0"/>
+          <a:chExt cx="0" cy="0"/>
+        </a:xfrm>
+      </p:grpSpPr>
+      <p:sp>
+        <p:nvSpPr>
+          <p:cNvPr id="2" name="Espaço Reservado para Imagem de Slide 1"/>
+          <p:cNvSpPr>
+            <a:spLocks noGrp="1" noRot="1" noChangeAspect="1"/>
+          </p:cNvSpPr>
+          <p:nvPr>
+            <p:ph type="sldImg"/>
+          </p:nvPr>
+        </p:nvSpPr>
+        <p:spPr/>
+      </p:sp>
+      <p:sp>
+        <p:nvSpPr>
+          <p:cNvPr id="3" name="Espaço Reservado para Anotações 2"/>
+          <p:cNvSpPr>
+            <a:spLocks noGrp="1"/>
+          </p:cNvSpPr>
+          <p:nvPr>
+            <p:ph type="body" idx="1"/>
+          </p:nvPr>
+        </p:nvSpPr>
+        <p:spPr/>
+        <p:txBody>
+          <a:bodyPr/>
+          <a:lstStyle/>
+          <a:p>
+            <a:r>
+              <a:rPr lang="pt-BR" dirty="0" smtClean="0"/>
+              <a:t>Análise:</a:t>
+            </a:r>
+            <a:r>
+              <a:rPr lang="pt-BR" baseline="0" dirty="0" smtClean="0"/>
+              <a:t> s</a:t>
+            </a:r>
+            <a:r>
+              <a:rPr lang="pt-BR" dirty="0" smtClean="0"/>
+              <a:t>eparação ou desagregação das diversas partes constituintes de um todo; decomposição</a:t>
+            </a:r>
+            <a:endParaRPr lang="pt-BR" dirty="0"/>
+          </a:p>
+        </p:txBody>
+      </p:sp>
+      <p:sp>
+        <p:nvSpPr>
+          <p:cNvPr id="4" name="Espaço Reservado para Número de Slide 3"/>
+          <p:cNvSpPr>
+            <a:spLocks noGrp="1"/>
+          </p:cNvSpPr>
+          <p:nvPr>
+            <p:ph type="sldNum" sz="quarter" idx="10"/>
+          </p:nvPr>
+        </p:nvSpPr>
+        <p:spPr/>
+        <p:txBody>
+          <a:bodyPr/>
+          <a:lstStyle/>
+          <a:p>
+            <a:fld id="{C48F62DC-FC9D-4FCA-9DAA-BAE343AB7EDA}" type="slidenum">
+              <a:rPr lang="pt-BR" smtClean="0"/>
+              <a:t>1</a:t>
+            </a:fld>
+            <a:endParaRPr lang="pt-BR"/>
+          </a:p>
+        </p:txBody>
+      </p:sp>
+    </p:spTree>
+    <p:extLst>
+      <p:ext uri="{BB962C8B-B14F-4D97-AF65-F5344CB8AC3E}">
+        <p14:creationId xmlns:p14="http://schemas.microsoft.com/office/powerpoint/2010/main" val="1618625436"/>
+      </p:ext>
+    </p:extLst>
+  </p:cSld>
+  <p:clrMapOvr>
+    <a:masterClrMapping/>
+  </p:clrMapOvr>
+</p:notes>
+</file>
+
+<file path=ppt/notesSlides/notesSlide2.xml><?xml version="1.0" encoding="utf-8"?>
+<p:notes xmlns:a="http://schemas.openxmlformats.org/drawingml/2006/main" xmlns:r="http://schemas.openxmlformats.org/officeDocument/2006/relationships" xmlns:p="http://schemas.openxmlformats.org/presentationml/2006/main">
+  <p:cSld>
+    <p:spTree>
+      <p:nvGrpSpPr>
+        <p:cNvPr id="1" name=""/>
+        <p:cNvGrpSpPr/>
+        <p:nvPr/>
+      </p:nvGrpSpPr>
+      <p:grpSpPr>
+        <a:xfrm>
+          <a:off x="0" y="0"/>
+          <a:ext cx="0" cy="0"/>
+          <a:chOff x="0" y="0"/>
+          <a:chExt cx="0" cy="0"/>
+        </a:xfrm>
+      </p:grpSpPr>
+      <p:sp>
+        <p:nvSpPr>
+          <p:cNvPr id="2" name="Espaço Reservado para Imagem de Slide 1"/>
+          <p:cNvSpPr>
+            <a:spLocks noGrp="1" noRot="1" noChangeAspect="1"/>
+          </p:cNvSpPr>
+          <p:nvPr>
+            <p:ph type="sldImg"/>
+          </p:nvPr>
+        </p:nvSpPr>
+        <p:spPr/>
+      </p:sp>
+      <p:sp>
+        <p:nvSpPr>
+          <p:cNvPr id="3" name="Espaço Reservado para Anotações 2"/>
+          <p:cNvSpPr>
+            <a:spLocks noGrp="1"/>
+          </p:cNvSpPr>
+          <p:nvPr>
+            <p:ph type="body" idx="1"/>
+          </p:nvPr>
+        </p:nvSpPr>
+        <p:spPr/>
+        <p:txBody>
+          <a:bodyPr/>
+          <a:lstStyle/>
+          <a:p>
+            <a:r>
+              <a:rPr lang="pt-BR" dirty="0" smtClean="0"/>
+              <a:t>Amostra: porção, fragmento ou unidade de um produto natural ou fabricado destituído de valor comercial, e apresentado para demonstrar sua natureza, qualidade ou tipo</a:t>
+            </a:r>
+            <a:endParaRPr lang="pt-BR" dirty="0"/>
+          </a:p>
+        </p:txBody>
+      </p:sp>
+      <p:sp>
+        <p:nvSpPr>
+          <p:cNvPr id="4" name="Espaço Reservado para Número de Slide 3"/>
+          <p:cNvSpPr>
+            <a:spLocks noGrp="1"/>
+          </p:cNvSpPr>
+          <p:nvPr>
+            <p:ph type="sldNum" sz="quarter" idx="10"/>
+          </p:nvPr>
+        </p:nvSpPr>
+        <p:spPr/>
+        <p:txBody>
+          <a:bodyPr/>
+          <a:lstStyle/>
+          <a:p>
+            <a:fld id="{C48F62DC-FC9D-4FCA-9DAA-BAE343AB7EDA}" type="slidenum">
+              <a:rPr lang="pt-BR" smtClean="0"/>
+              <a:t>3</a:t>
+            </a:fld>
+            <a:endParaRPr lang="pt-BR"/>
+          </a:p>
+        </p:txBody>
+      </p:sp>
+    </p:spTree>
+    <p:extLst>
+      <p:ext uri="{BB962C8B-B14F-4D97-AF65-F5344CB8AC3E}">
+        <p14:creationId xmlns:p14="http://schemas.microsoft.com/office/powerpoint/2010/main" val="3271703488"/>
+      </p:ext>
+    </p:extLst>
+  </p:cSld>
+  <p:clrMapOvr>
+    <a:masterClrMapping/>
+  </p:clrMapOvr>
+</p:notes>
+</file>
+
+<file path=ppt/notesSlides/notesSlide3.xml><?xml version="1.0" encoding="utf-8"?>
+<p:notes xmlns:a="http://schemas.openxmlformats.org/drawingml/2006/main" xmlns:r="http://schemas.openxmlformats.org/officeDocument/2006/relationships" xmlns:p="http://schemas.openxmlformats.org/presentationml/2006/main">
+  <p:cSld>
+    <p:spTree>
+      <p:nvGrpSpPr>
+        <p:cNvPr id="1" name=""/>
+        <p:cNvGrpSpPr/>
+        <p:nvPr/>
+      </p:nvGrpSpPr>
+      <p:grpSpPr>
+        <a:xfrm>
+          <a:off x="0" y="0"/>
+          <a:ext cx="0" cy="0"/>
+          <a:chOff x="0" y="0"/>
+          <a:chExt cx="0" cy="0"/>
+        </a:xfrm>
+      </p:grpSpPr>
+      <p:sp>
+        <p:nvSpPr>
+          <p:cNvPr id="2" name="Espaço Reservado para Imagem de Slide 1"/>
+          <p:cNvSpPr>
+            <a:spLocks noGrp="1" noRot="1" noChangeAspect="1"/>
+          </p:cNvSpPr>
+          <p:nvPr>
+            <p:ph type="sldImg"/>
+          </p:nvPr>
+        </p:nvSpPr>
+        <p:spPr/>
+      </p:sp>
+      <p:sp>
+        <p:nvSpPr>
+          <p:cNvPr id="3" name="Espaço Reservado para Anotações 2"/>
+          <p:cNvSpPr>
+            <a:spLocks noGrp="1"/>
+          </p:cNvSpPr>
+          <p:nvPr>
+            <p:ph type="body" idx="1"/>
+          </p:nvPr>
+        </p:nvSpPr>
+        <p:spPr/>
+        <p:txBody>
+          <a:bodyPr/>
+          <a:lstStyle/>
+          <a:p>
+            <a:r>
+              <a:rPr lang="pt-BR" sz="1200" b="0" i="0" kern="1200" dirty="0" smtClean="0">
+                <a:solidFill>
+                  <a:schemeClr val="tx1"/>
+                </a:solidFill>
+                <a:effectLst/>
+                <a:latin typeface="+mn-lt"/>
+                <a:ea typeface="+mn-ea"/>
+                <a:cs typeface="+mn-cs"/>
+              </a:rPr>
+              <a:t>=SE(C2 =”Sim”, 1,2) diz SE(C2 = Sim, então retorne a 1, caso contrário retorne a 2).</a:t>
+            </a:r>
+          </a:p>
+          <a:p>
+            <a:r>
+              <a:rPr lang="pt-BR" sz="1200" b="0" i="0" kern="1200" dirty="0" smtClean="0">
+                <a:solidFill>
+                  <a:schemeClr val="tx1"/>
+                </a:solidFill>
+                <a:effectLst/>
+                <a:latin typeface="+mn-lt"/>
+                <a:ea typeface="+mn-ea"/>
+                <a:cs typeface="+mn-cs"/>
+              </a:rPr>
+              <a:t>=DATADIF(D2;E2;”a”)</a:t>
+            </a:r>
+            <a:r>
+              <a:rPr lang="pt-BR" sz="1200" b="0" i="0" kern="1200" baseline="0" dirty="0" smtClean="0">
+                <a:solidFill>
+                  <a:schemeClr val="tx1"/>
+                </a:solidFill>
+                <a:effectLst/>
+                <a:latin typeface="+mn-lt"/>
+                <a:ea typeface="+mn-ea"/>
+                <a:cs typeface="+mn-cs"/>
+              </a:rPr>
+              <a:t> //para a diferença da data em anos</a:t>
+            </a:r>
+          </a:p>
+          <a:p>
+            <a:r>
+              <a:rPr lang="pt-BR" sz="1200" b="0" i="0" kern="1200" dirty="0" smtClean="0">
+                <a:solidFill>
+                  <a:schemeClr val="tx1"/>
+                </a:solidFill>
+                <a:effectLst/>
+                <a:latin typeface="+mn-lt"/>
+                <a:ea typeface="+mn-ea"/>
+                <a:cs typeface="+mn-cs"/>
+              </a:rPr>
+              <a:t>=DATADIF(D17,E17,”y”)&amp;”</a:t>
+            </a:r>
+            <a:r>
+              <a:rPr lang="pt-BR" sz="1200" b="0" i="0" kern="1200" dirty="0" err="1" smtClean="0">
+                <a:solidFill>
+                  <a:schemeClr val="tx1"/>
+                </a:solidFill>
+                <a:effectLst/>
+                <a:latin typeface="+mn-lt"/>
+                <a:ea typeface="+mn-ea"/>
+                <a:cs typeface="+mn-cs"/>
+              </a:rPr>
+              <a:t>anos”,&amp;DATADIF</a:t>
+            </a:r>
+            <a:r>
+              <a:rPr lang="pt-BR" sz="1200" b="0" i="0" kern="1200" dirty="0" smtClean="0">
+                <a:solidFill>
+                  <a:schemeClr val="tx1"/>
+                </a:solidFill>
+                <a:effectLst/>
+                <a:latin typeface="+mn-lt"/>
+                <a:ea typeface="+mn-ea"/>
+                <a:cs typeface="+mn-cs"/>
+              </a:rPr>
+              <a:t>(D17,E17,”am”&amp;”meses”,&amp;E17-DATA(ANO(E17),MÊS(E17),1)&amp;”dias”</a:t>
+            </a:r>
+          </a:p>
+          <a:p>
+            <a:endParaRPr lang="pt-BR" dirty="0"/>
+          </a:p>
+        </p:txBody>
+      </p:sp>
+      <p:sp>
+        <p:nvSpPr>
+          <p:cNvPr id="4" name="Espaço Reservado para Número de Slide 3"/>
+          <p:cNvSpPr>
+            <a:spLocks noGrp="1"/>
+          </p:cNvSpPr>
+          <p:nvPr>
+            <p:ph type="sldNum" sz="quarter" idx="10"/>
+          </p:nvPr>
+        </p:nvSpPr>
+        <p:spPr/>
+        <p:txBody>
+          <a:bodyPr/>
+          <a:lstStyle/>
+          <a:p>
+            <a:fld id="{C48F62DC-FC9D-4FCA-9DAA-BAE343AB7EDA}" type="slidenum">
+              <a:rPr lang="pt-BR" smtClean="0"/>
+              <a:t>14</a:t>
+            </a:fld>
+            <a:endParaRPr lang="pt-BR"/>
+          </a:p>
+        </p:txBody>
+      </p:sp>
+    </p:spTree>
+    <p:extLst>
+      <p:ext uri="{BB962C8B-B14F-4D97-AF65-F5344CB8AC3E}">
+        <p14:creationId xmlns:p14="http://schemas.microsoft.com/office/powerpoint/2010/main" val="967160035"/>
+      </p:ext>
+    </p:extLst>
+  </p:cSld>
+  <p:clrMapOvr>
+    <a:masterClrMapping/>
+  </p:clrMapOvr>
+</p:notes>
+</file>
+
 <file path=ppt/slideLayouts/slideLayout1.xml><?xml version="1.0" encoding="utf-8"?>
 <p:sldLayout xmlns:a="http://schemas.openxmlformats.org/drawingml/2006/main" xmlns:r="http://schemas.openxmlformats.org/officeDocument/2006/relationships" xmlns:p="http://schemas.openxmlformats.org/presentationml/2006/main" showMasterSp="0" type="title" preserve="1">
   <p:cSld name="Slide de título">
@@ -7560,7 +7703,7 @@
           <a:noFill/>
           <a:extLst>
             <a:ext uri="{909E8E84-426E-40dd-AFC4-6F175D3DCCD1}">
-              <a14:hiddenFill xmlns:a14="http://schemas.microsoft.com/office/drawing/2010/main" xmlns="">
+              <a14:hiddenFill xmlns="" xmlns:a14="http://schemas.microsoft.com/office/drawing/2010/main">
                 <a:solidFill>
                   <a:srgbClr val="FFFFFF"/>
                 </a:solidFill>
@@ -7620,7 +7763,7 @@
             </a:ln>
             <a:extLst>
               <a:ext uri="{91240B29-F687-4f45-9708-019B960494DF}">
-                <a14:hiddenLine xmlns:a14="http://schemas.microsoft.com/office/drawing/2010/main" xmlns="" w="9525">
+                <a14:hiddenLine xmlns="" xmlns:a14="http://schemas.microsoft.com/office/drawing/2010/main" w="9525">
                   <a:solidFill>
                     <a:srgbClr val="000000"/>
                   </a:solidFill>
@@ -7710,7 +7853,7 @@
             </a:ln>
             <a:extLst>
               <a:ext uri="{91240B29-F687-4f45-9708-019B960494DF}">
-                <a14:hiddenLine xmlns:a14="http://schemas.microsoft.com/office/drawing/2010/main" xmlns="" w="9525">
+                <a14:hiddenLine xmlns="" xmlns:a14="http://schemas.microsoft.com/office/drawing/2010/main" w="9525">
                   <a:solidFill>
                     <a:srgbClr val="000000"/>
                   </a:solidFill>
@@ -7800,7 +7943,7 @@
             </a:ln>
             <a:extLst>
               <a:ext uri="{91240B29-F687-4f45-9708-019B960494DF}">
-                <a14:hiddenLine xmlns:a14="http://schemas.microsoft.com/office/drawing/2010/main" xmlns="" w="9525">
+                <a14:hiddenLine xmlns="" xmlns:a14="http://schemas.microsoft.com/office/drawing/2010/main" w="9525">
                   <a:solidFill>
                     <a:srgbClr val="000000"/>
                   </a:solidFill>
@@ -7834,7 +7977,7 @@
             </a:ln>
             <a:extLst>
               <a:ext uri="{91240B29-F687-4f45-9708-019B960494DF}">
-                <a14:hiddenLine xmlns:a14="http://schemas.microsoft.com/office/drawing/2010/main" xmlns="" w="9525">
+                <a14:hiddenLine xmlns="" xmlns:a14="http://schemas.microsoft.com/office/drawing/2010/main" w="9525">
                   <a:solidFill>
                     <a:srgbClr val="000000"/>
                   </a:solidFill>
@@ -7924,7 +8067,7 @@
             </a:ln>
             <a:extLst>
               <a:ext uri="{91240B29-F687-4f45-9708-019B960494DF}">
-                <a14:hiddenLine xmlns:a14="http://schemas.microsoft.com/office/drawing/2010/main" xmlns="" w="9525">
+                <a14:hiddenLine xmlns="" xmlns:a14="http://schemas.microsoft.com/office/drawing/2010/main" w="9525">
                   <a:solidFill>
                     <a:srgbClr val="000000"/>
                   </a:solidFill>
@@ -7986,7 +8129,7 @@
             </a:ln>
             <a:extLst>
               <a:ext uri="{91240B29-F687-4f45-9708-019B960494DF}">
-                <a14:hiddenLine xmlns:a14="http://schemas.microsoft.com/office/drawing/2010/main" xmlns="" w="9525">
+                <a14:hiddenLine xmlns="" xmlns:a14="http://schemas.microsoft.com/office/drawing/2010/main" w="9525">
                   <a:solidFill>
                     <a:srgbClr val="000000"/>
                   </a:solidFill>
@@ -8048,7 +8191,7 @@
             </a:ln>
             <a:extLst>
               <a:ext uri="{91240B29-F687-4f45-9708-019B960494DF}">
-                <a14:hiddenLine xmlns:a14="http://schemas.microsoft.com/office/drawing/2010/main" xmlns="" w="9525">
+                <a14:hiddenLine xmlns="" xmlns:a14="http://schemas.microsoft.com/office/drawing/2010/main" w="9525">
                   <a:solidFill>
                     <a:srgbClr val="000000"/>
                   </a:solidFill>
@@ -8138,7 +8281,7 @@
             </a:ln>
             <a:extLst>
               <a:ext uri="{91240B29-F687-4f45-9708-019B960494DF}">
-                <a14:hiddenLine xmlns:a14="http://schemas.microsoft.com/office/drawing/2010/main" xmlns="" w="9525">
+                <a14:hiddenLine xmlns="" xmlns:a14="http://schemas.microsoft.com/office/drawing/2010/main" w="9525">
                   <a:solidFill>
                     <a:srgbClr val="000000"/>
                   </a:solidFill>
@@ -8200,7 +8343,7 @@
             </a:ln>
             <a:extLst>
               <a:ext uri="{91240B29-F687-4f45-9708-019B960494DF}">
-                <a14:hiddenLine xmlns:a14="http://schemas.microsoft.com/office/drawing/2010/main" xmlns="" w="9525">
+                <a14:hiddenLine xmlns="" xmlns:a14="http://schemas.microsoft.com/office/drawing/2010/main" w="9525">
                   <a:solidFill>
                     <a:srgbClr val="000000"/>
                   </a:solidFill>
@@ -8262,7 +8405,7 @@
             </a:ln>
             <a:extLst>
               <a:ext uri="{91240B29-F687-4f45-9708-019B960494DF}">
-                <a14:hiddenLine xmlns:a14="http://schemas.microsoft.com/office/drawing/2010/main" xmlns="" w="9525">
+                <a14:hiddenLine xmlns="" xmlns:a14="http://schemas.microsoft.com/office/drawing/2010/main" w="9525">
                   <a:solidFill>
                     <a:srgbClr val="000000"/>
                   </a:solidFill>
@@ -8352,7 +8495,7 @@
             </a:ln>
             <a:extLst>
               <a:ext uri="{91240B29-F687-4f45-9708-019B960494DF}">
-                <a14:hiddenLine xmlns:a14="http://schemas.microsoft.com/office/drawing/2010/main" xmlns="" w="9525">
+                <a14:hiddenLine xmlns="" xmlns:a14="http://schemas.microsoft.com/office/drawing/2010/main" w="9525">
                   <a:solidFill>
                     <a:srgbClr val="000000"/>
                   </a:solidFill>
@@ -8442,7 +8585,7 @@
             </a:ln>
             <a:extLst>
               <a:ext uri="{91240B29-F687-4f45-9708-019B960494DF}">
-                <a14:hiddenLine xmlns:a14="http://schemas.microsoft.com/office/drawing/2010/main" xmlns="" w="9525">
+                <a14:hiddenLine xmlns="" xmlns:a14="http://schemas.microsoft.com/office/drawing/2010/main" w="9525">
                   <a:solidFill>
                     <a:srgbClr val="000000"/>
                   </a:solidFill>
@@ -8504,7 +8647,7 @@
             </a:ln>
             <a:extLst>
               <a:ext uri="{91240B29-F687-4f45-9708-019B960494DF}">
-                <a14:hiddenLine xmlns:a14="http://schemas.microsoft.com/office/drawing/2010/main" xmlns="" w="9525">
+                <a14:hiddenLine xmlns="" xmlns:a14="http://schemas.microsoft.com/office/drawing/2010/main" w="9525">
                   <a:solidFill>
                     <a:srgbClr val="000000"/>
                   </a:solidFill>
@@ -8614,7 +8757,7 @@
             </a:ln>
             <a:extLst>
               <a:ext uri="{91240B29-F687-4f45-9708-019B960494DF}">
-                <a14:hiddenLine xmlns:a14="http://schemas.microsoft.com/office/drawing/2010/main" xmlns="" w="9525">
+                <a14:hiddenLine xmlns="" xmlns:a14="http://schemas.microsoft.com/office/drawing/2010/main" w="9525">
                   <a:solidFill>
                     <a:srgbClr val="000000"/>
                   </a:solidFill>
@@ -8676,7 +8819,7 @@
             </a:ln>
             <a:extLst>
               <a:ext uri="{91240B29-F687-4f45-9708-019B960494DF}">
-                <a14:hiddenLine xmlns:a14="http://schemas.microsoft.com/office/drawing/2010/main" xmlns="" w="9525">
+                <a14:hiddenLine xmlns="" xmlns:a14="http://schemas.microsoft.com/office/drawing/2010/main" w="9525">
                   <a:solidFill>
                     <a:srgbClr val="000000"/>
                   </a:solidFill>
@@ -8766,7 +8909,7 @@
             </a:ln>
             <a:extLst>
               <a:ext uri="{91240B29-F687-4f45-9708-019B960494DF}">
-                <a14:hiddenLine xmlns:a14="http://schemas.microsoft.com/office/drawing/2010/main" xmlns="" w="9525">
+                <a14:hiddenLine xmlns="" xmlns:a14="http://schemas.microsoft.com/office/drawing/2010/main" w="9525">
                   <a:solidFill>
                     <a:srgbClr val="000000"/>
                   </a:solidFill>
@@ -8856,7 +8999,7 @@
             </a:ln>
             <a:extLst>
               <a:ext uri="{91240B29-F687-4f45-9708-019B960494DF}">
-                <a14:hiddenLine xmlns:a14="http://schemas.microsoft.com/office/drawing/2010/main" xmlns="" w="9525">
+                <a14:hiddenLine xmlns="" xmlns:a14="http://schemas.microsoft.com/office/drawing/2010/main" w="9525">
                   <a:solidFill>
                     <a:srgbClr val="000000"/>
                   </a:solidFill>
@@ -8918,7 +9061,7 @@
             </a:ln>
             <a:extLst>
               <a:ext uri="{91240B29-F687-4f45-9708-019B960494DF}">
-                <a14:hiddenLine xmlns:a14="http://schemas.microsoft.com/office/drawing/2010/main" xmlns="" w="9525">
+                <a14:hiddenLine xmlns="" xmlns:a14="http://schemas.microsoft.com/office/drawing/2010/main" w="9525">
                   <a:solidFill>
                     <a:srgbClr val="000000"/>
                   </a:solidFill>
@@ -9008,7 +9151,7 @@
             </a:ln>
             <a:extLst>
               <a:ext uri="{91240B29-F687-4f45-9708-019B960494DF}">
-                <a14:hiddenLine xmlns:a14="http://schemas.microsoft.com/office/drawing/2010/main" xmlns="" w="9525">
+                <a14:hiddenLine xmlns="" xmlns:a14="http://schemas.microsoft.com/office/drawing/2010/main" w="9525">
                   <a:solidFill>
                     <a:srgbClr val="000000"/>
                   </a:solidFill>
@@ -9098,7 +9241,7 @@
             </a:ln>
             <a:extLst>
               <a:ext uri="{91240B29-F687-4f45-9708-019B960494DF}">
-                <a14:hiddenLine xmlns:a14="http://schemas.microsoft.com/office/drawing/2010/main" xmlns="" w="9525">
+                <a14:hiddenLine xmlns="" xmlns:a14="http://schemas.microsoft.com/office/drawing/2010/main" w="9525">
                   <a:solidFill>
                     <a:srgbClr val="000000"/>
                   </a:solidFill>
@@ -9154,7 +9297,7 @@
             </a:ln>
             <a:extLst>
               <a:ext uri="{91240B29-F687-4f45-9708-019B960494DF}">
-                <a14:hiddenLine xmlns:a14="http://schemas.microsoft.com/office/drawing/2010/main" xmlns="" w="9525">
+                <a14:hiddenLine xmlns="" xmlns:a14="http://schemas.microsoft.com/office/drawing/2010/main" w="9525">
                   <a:solidFill>
                     <a:srgbClr val="000000"/>
                   </a:solidFill>
@@ -9244,7 +9387,7 @@
             </a:ln>
             <a:extLst>
               <a:ext uri="{91240B29-F687-4f45-9708-019B960494DF}">
-                <a14:hiddenLine xmlns:a14="http://schemas.microsoft.com/office/drawing/2010/main" xmlns="" w="9525">
+                <a14:hiddenLine xmlns="" xmlns:a14="http://schemas.microsoft.com/office/drawing/2010/main" w="9525">
                   <a:solidFill>
                     <a:srgbClr val="000000"/>
                   </a:solidFill>
@@ -9300,7 +9443,7 @@
             </a:ln>
             <a:extLst>
               <a:ext uri="{91240B29-F687-4f45-9708-019B960494DF}">
-                <a14:hiddenLine xmlns:a14="http://schemas.microsoft.com/office/drawing/2010/main" xmlns="" w="9525">
+                <a14:hiddenLine xmlns="" xmlns:a14="http://schemas.microsoft.com/office/drawing/2010/main" w="9525">
                   <a:solidFill>
                     <a:srgbClr val="000000"/>
                   </a:solidFill>
@@ -9390,7 +9533,7 @@
             </a:ln>
             <a:extLst>
               <a:ext uri="{91240B29-F687-4f45-9708-019B960494DF}">
-                <a14:hiddenLine xmlns:a14="http://schemas.microsoft.com/office/drawing/2010/main" xmlns="" w="9525">
+                <a14:hiddenLine xmlns="" xmlns:a14="http://schemas.microsoft.com/office/drawing/2010/main" w="9525">
                   <a:solidFill>
                     <a:srgbClr val="000000"/>
                   </a:solidFill>
@@ -9458,7 +9601,7 @@
             </a:ln>
             <a:extLst>
               <a:ext uri="{91240B29-F687-4f45-9708-019B960494DF}">
-                <a14:hiddenLine xmlns:a14="http://schemas.microsoft.com/office/drawing/2010/main" xmlns="" w="9525">
+                <a14:hiddenLine xmlns="" xmlns:a14="http://schemas.microsoft.com/office/drawing/2010/main" w="9525">
                   <a:solidFill>
                     <a:srgbClr val="000000"/>
                   </a:solidFill>
@@ -9548,7 +9691,7 @@
             </a:ln>
             <a:extLst>
               <a:ext uri="{91240B29-F687-4f45-9708-019B960494DF}">
-                <a14:hiddenLine xmlns:a14="http://schemas.microsoft.com/office/drawing/2010/main" xmlns="" w="9525">
+                <a14:hiddenLine xmlns="" xmlns:a14="http://schemas.microsoft.com/office/drawing/2010/main" w="9525">
                   <a:solidFill>
                     <a:srgbClr val="000000"/>
                   </a:solidFill>
@@ -9616,7 +9759,7 @@
             </a:ln>
             <a:extLst>
               <a:ext uri="{91240B29-F687-4f45-9708-019B960494DF}">
-                <a14:hiddenLine xmlns:a14="http://schemas.microsoft.com/office/drawing/2010/main" xmlns="" w="9525">
+                <a14:hiddenLine xmlns="" xmlns:a14="http://schemas.microsoft.com/office/drawing/2010/main" w="9525">
                   <a:solidFill>
                     <a:srgbClr val="000000"/>
                   </a:solidFill>
@@ -9706,7 +9849,7 @@
             </a:ln>
             <a:extLst>
               <a:ext uri="{91240B29-F687-4f45-9708-019B960494DF}">
-                <a14:hiddenLine xmlns:a14="http://schemas.microsoft.com/office/drawing/2010/main" xmlns="" w="9525">
+                <a14:hiddenLine xmlns="" xmlns:a14="http://schemas.microsoft.com/office/drawing/2010/main" w="9525">
                   <a:solidFill>
                     <a:srgbClr val="000000"/>
                   </a:solidFill>
@@ -9740,7 +9883,7 @@
             </a:ln>
             <a:extLst>
               <a:ext uri="{91240B29-F687-4f45-9708-019B960494DF}">
-                <a14:hiddenLine xmlns:a14="http://schemas.microsoft.com/office/drawing/2010/main" xmlns="" w="9525">
+                <a14:hiddenLine xmlns="" xmlns:a14="http://schemas.microsoft.com/office/drawing/2010/main" w="9525">
                   <a:solidFill>
                     <a:srgbClr val="000000"/>
                   </a:solidFill>
@@ -9830,7 +9973,7 @@
             </a:ln>
             <a:extLst>
               <a:ext uri="{91240B29-F687-4f45-9708-019B960494DF}">
-                <a14:hiddenLine xmlns:a14="http://schemas.microsoft.com/office/drawing/2010/main" xmlns="" w="9525">
+                <a14:hiddenLine xmlns="" xmlns:a14="http://schemas.microsoft.com/office/drawing/2010/main" w="9525">
                   <a:solidFill>
                     <a:srgbClr val="000000"/>
                   </a:solidFill>
@@ -9892,7 +10035,7 @@
             </a:ln>
             <a:extLst>
               <a:ext uri="{91240B29-F687-4f45-9708-019B960494DF}">
-                <a14:hiddenLine xmlns:a14="http://schemas.microsoft.com/office/drawing/2010/main" xmlns="" w="9525">
+                <a14:hiddenLine xmlns="" xmlns:a14="http://schemas.microsoft.com/office/drawing/2010/main" w="9525">
                   <a:solidFill>
                     <a:srgbClr val="000000"/>
                   </a:solidFill>
@@ -9954,7 +10097,7 @@
             </a:ln>
             <a:extLst>
               <a:ext uri="{91240B29-F687-4f45-9708-019B960494DF}">
-                <a14:hiddenLine xmlns:a14="http://schemas.microsoft.com/office/drawing/2010/main" xmlns="" w="9525">
+                <a14:hiddenLine xmlns="" xmlns:a14="http://schemas.microsoft.com/office/drawing/2010/main" w="9525">
                   <a:solidFill>
                     <a:srgbClr val="000000"/>
                   </a:solidFill>
@@ -10044,7 +10187,7 @@
             </a:ln>
             <a:extLst>
               <a:ext uri="{91240B29-F687-4f45-9708-019B960494DF}">
-                <a14:hiddenLine xmlns:a14="http://schemas.microsoft.com/office/drawing/2010/main" xmlns="" w="9525">
+                <a14:hiddenLine xmlns="" xmlns:a14="http://schemas.microsoft.com/office/drawing/2010/main" w="9525">
                   <a:solidFill>
                     <a:srgbClr val="000000"/>
                   </a:solidFill>
@@ -10112,7 +10255,7 @@
             </a:ln>
             <a:extLst>
               <a:ext uri="{91240B29-F687-4f45-9708-019B960494DF}">
-                <a14:hiddenLine xmlns:a14="http://schemas.microsoft.com/office/drawing/2010/main" xmlns="" w="9525">
+                <a14:hiddenLine xmlns="" xmlns:a14="http://schemas.microsoft.com/office/drawing/2010/main" w="9525">
                   <a:solidFill>
                     <a:srgbClr val="000000"/>
                   </a:solidFill>
@@ -10174,7 +10317,7 @@
             </a:ln>
             <a:extLst>
               <a:ext uri="{91240B29-F687-4f45-9708-019B960494DF}">
-                <a14:hiddenLine xmlns:a14="http://schemas.microsoft.com/office/drawing/2010/main" xmlns="" w="9525">
+                <a14:hiddenLine xmlns="" xmlns:a14="http://schemas.microsoft.com/office/drawing/2010/main" w="9525">
                   <a:solidFill>
                     <a:srgbClr val="000000"/>
                   </a:solidFill>
@@ -10264,7 +10407,7 @@
             </a:ln>
             <a:extLst>
               <a:ext uri="{91240B29-F687-4f45-9708-019B960494DF}">
-                <a14:hiddenLine xmlns:a14="http://schemas.microsoft.com/office/drawing/2010/main" xmlns="" w="9525">
+                <a14:hiddenLine xmlns="" xmlns:a14="http://schemas.microsoft.com/office/drawing/2010/main" w="9525">
                   <a:solidFill>
                     <a:srgbClr val="000000"/>
                   </a:solidFill>
@@ -10326,7 +10469,7 @@
             </a:ln>
             <a:extLst>
               <a:ext uri="{91240B29-F687-4f45-9708-019B960494DF}">
-                <a14:hiddenLine xmlns:a14="http://schemas.microsoft.com/office/drawing/2010/main" xmlns="" w="9525">
+                <a14:hiddenLine xmlns="" xmlns:a14="http://schemas.microsoft.com/office/drawing/2010/main" w="9525">
                   <a:solidFill>
                     <a:srgbClr val="000000"/>
                   </a:solidFill>
@@ -10416,7 +10559,7 @@
             </a:ln>
             <a:extLst>
               <a:ext uri="{91240B29-F687-4f45-9708-019B960494DF}">
-                <a14:hiddenLine xmlns:a14="http://schemas.microsoft.com/office/drawing/2010/main" xmlns="" w="9525">
+                <a14:hiddenLine xmlns="" xmlns:a14="http://schemas.microsoft.com/office/drawing/2010/main" w="9525">
                   <a:solidFill>
                     <a:srgbClr val="000000"/>
                   </a:solidFill>
@@ -10478,7 +10621,7 @@
             </a:ln>
             <a:extLst>
               <a:ext uri="{91240B29-F687-4f45-9708-019B960494DF}">
-                <a14:hiddenLine xmlns:a14="http://schemas.microsoft.com/office/drawing/2010/main" xmlns="" w="9525">
+                <a14:hiddenLine xmlns="" xmlns:a14="http://schemas.microsoft.com/office/drawing/2010/main" w="9525">
                   <a:solidFill>
                     <a:srgbClr val="000000"/>
                   </a:solidFill>
@@ -10568,7 +10711,7 @@
             </a:ln>
             <a:extLst>
               <a:ext uri="{91240B29-F687-4f45-9708-019B960494DF}">
-                <a14:hiddenLine xmlns:a14="http://schemas.microsoft.com/office/drawing/2010/main" xmlns="" w="9525">
+                <a14:hiddenLine xmlns="" xmlns:a14="http://schemas.microsoft.com/office/drawing/2010/main" w="9525">
                   <a:solidFill>
                     <a:srgbClr val="000000"/>
                   </a:solidFill>
@@ -10602,7 +10745,7 @@
             </a:ln>
             <a:extLst>
               <a:ext uri="{91240B29-F687-4f45-9708-019B960494DF}">
-                <a14:hiddenLine xmlns:a14="http://schemas.microsoft.com/office/drawing/2010/main" xmlns="" w="9525">
+                <a14:hiddenLine xmlns="" xmlns:a14="http://schemas.microsoft.com/office/drawing/2010/main" w="9525">
                   <a:solidFill>
                     <a:srgbClr val="000000"/>
                   </a:solidFill>
@@ -10667,7 +10810,7 @@
             </a:ln>
             <a:extLst>
               <a:ext uri="{91240B29-F687-4f45-9708-019B960494DF}">
-                <a14:hiddenLine xmlns:a14="http://schemas.microsoft.com/office/drawing/2010/main" xmlns="" w="9525">
+                <a14:hiddenLine xmlns="" xmlns:a14="http://schemas.microsoft.com/office/drawing/2010/main" w="9525">
                   <a:solidFill>
                     <a:srgbClr val="000000"/>
                   </a:solidFill>
@@ -10757,7 +10900,7 @@
             </a:ln>
             <a:extLst>
               <a:ext uri="{91240B29-F687-4f45-9708-019B960494DF}">
-                <a14:hiddenLine xmlns:a14="http://schemas.microsoft.com/office/drawing/2010/main" xmlns="" w="9525">
+                <a14:hiddenLine xmlns="" xmlns:a14="http://schemas.microsoft.com/office/drawing/2010/main" w="9525">
                   <a:solidFill>
                     <a:srgbClr val="000000"/>
                   </a:solidFill>
@@ -10819,7 +10962,7 @@
             </a:ln>
             <a:extLst>
               <a:ext uri="{91240B29-F687-4f45-9708-019B960494DF}">
-                <a14:hiddenLine xmlns:a14="http://schemas.microsoft.com/office/drawing/2010/main" xmlns="" w="9525">
+                <a14:hiddenLine xmlns="" xmlns:a14="http://schemas.microsoft.com/office/drawing/2010/main" w="9525">
                   <a:solidFill>
                     <a:srgbClr val="000000"/>
                   </a:solidFill>
@@ -10909,7 +11052,7 @@
             </a:ln>
             <a:extLst>
               <a:ext uri="{91240B29-F687-4f45-9708-019B960494DF}">
-                <a14:hiddenLine xmlns:a14="http://schemas.microsoft.com/office/drawing/2010/main" xmlns="" w="9525">
+                <a14:hiddenLine xmlns="" xmlns:a14="http://schemas.microsoft.com/office/drawing/2010/main" w="9525">
                   <a:solidFill>
                     <a:srgbClr val="000000"/>
                   </a:solidFill>
@@ -10999,7 +11142,7 @@
             </a:ln>
             <a:extLst>
               <a:ext uri="{91240B29-F687-4f45-9708-019B960494DF}">
-                <a14:hiddenLine xmlns:a14="http://schemas.microsoft.com/office/drawing/2010/main" xmlns="" w="9525">
+                <a14:hiddenLine xmlns="" xmlns:a14="http://schemas.microsoft.com/office/drawing/2010/main" w="9525">
                   <a:solidFill>
                     <a:srgbClr val="000000"/>
                   </a:solidFill>
@@ -11064,7 +11207,7 @@
             </a:ln>
             <a:extLst>
               <a:ext uri="{91240B29-F687-4f45-9708-019B960494DF}">
-                <a14:hiddenLine xmlns:a14="http://schemas.microsoft.com/office/drawing/2010/main" xmlns="" w="9525">
+                <a14:hiddenLine xmlns="" xmlns:a14="http://schemas.microsoft.com/office/drawing/2010/main" w="9525">
                   <a:solidFill>
                     <a:srgbClr val="000000"/>
                   </a:solidFill>
@@ -11126,7 +11269,7 @@
             </a:ln>
             <a:extLst>
               <a:ext uri="{91240B29-F687-4f45-9708-019B960494DF}">
-                <a14:hiddenLine xmlns:a14="http://schemas.microsoft.com/office/drawing/2010/main" xmlns="" w="9525">
+                <a14:hiddenLine xmlns="" xmlns:a14="http://schemas.microsoft.com/office/drawing/2010/main" w="9525">
                   <a:solidFill>
                     <a:srgbClr val="000000"/>
                   </a:solidFill>
@@ -11216,7 +11359,7 @@
             </a:ln>
             <a:extLst>
               <a:ext uri="{91240B29-F687-4f45-9708-019B960494DF}">
-                <a14:hiddenLine xmlns:a14="http://schemas.microsoft.com/office/drawing/2010/main" xmlns="" w="9525">
+                <a14:hiddenLine xmlns="" xmlns:a14="http://schemas.microsoft.com/office/drawing/2010/main" w="9525">
                   <a:solidFill>
                     <a:srgbClr val="000000"/>
                   </a:solidFill>
@@ -11306,7 +11449,7 @@
             </a:ln>
             <a:extLst>
               <a:ext uri="{91240B29-F687-4f45-9708-019B960494DF}">
-                <a14:hiddenLine xmlns:a14="http://schemas.microsoft.com/office/drawing/2010/main" xmlns="" w="9525">
+                <a14:hiddenLine xmlns="" xmlns:a14="http://schemas.microsoft.com/office/drawing/2010/main" w="9525">
                   <a:solidFill>
                     <a:srgbClr val="000000"/>
                   </a:solidFill>
@@ -11368,7 +11511,7 @@
             </a:ln>
             <a:extLst>
               <a:ext uri="{91240B29-F687-4f45-9708-019B960494DF}">
-                <a14:hiddenLine xmlns:a14="http://schemas.microsoft.com/office/drawing/2010/main" xmlns="" w="9525">
+                <a14:hiddenLine xmlns="" xmlns:a14="http://schemas.microsoft.com/office/drawing/2010/main" w="9525">
                   <a:solidFill>
                     <a:srgbClr val="000000"/>
                   </a:solidFill>
@@ -11488,7 +11631,7 @@
             </a:ln>
             <a:extLst>
               <a:ext uri="{91240B29-F687-4f45-9708-019B960494DF}">
-                <a14:hiddenLine xmlns:a14="http://schemas.microsoft.com/office/drawing/2010/main" xmlns="" w="9525">
+                <a14:hiddenLine xmlns="" xmlns:a14="http://schemas.microsoft.com/office/drawing/2010/main" w="9525">
                   <a:solidFill>
                     <a:srgbClr val="000000"/>
                   </a:solidFill>
@@ -11556,7 +11699,7 @@
             </a:ln>
             <a:extLst>
               <a:ext uri="{91240B29-F687-4f45-9708-019B960494DF}">
-                <a14:hiddenLine xmlns:a14="http://schemas.microsoft.com/office/drawing/2010/main" xmlns="" w="9525">
+                <a14:hiddenLine xmlns="" xmlns:a14="http://schemas.microsoft.com/office/drawing/2010/main" w="9525">
                   <a:solidFill>
                     <a:srgbClr val="000000"/>
                   </a:solidFill>
@@ -11646,7 +11789,7 @@
             </a:ln>
             <a:extLst>
               <a:ext uri="{91240B29-F687-4f45-9708-019B960494DF}">
-                <a14:hiddenLine xmlns:a14="http://schemas.microsoft.com/office/drawing/2010/main" xmlns="" w="9525">
+                <a14:hiddenLine xmlns="" xmlns:a14="http://schemas.microsoft.com/office/drawing/2010/main" w="9525">
                   <a:solidFill>
                     <a:srgbClr val="000000"/>
                   </a:solidFill>
@@ -11786,7 +11929,7 @@
           <a:p>
             <a:fld id="{48A87A34-81AB-432B-8DAE-1953F412C126}" type="datetimeFigureOut">
               <a:rPr lang="en-US" dirty="0"/>
-              <a:t>8/26/2019</a:t>
+              <a:t>8/30/2019</a:t>
             </a:fld>
             <a:endParaRPr lang="en-US" dirty="0"/>
           </a:p>
@@ -12048,7 +12191,7 @@
           <a:p>
             <a:fld id="{48A87A34-81AB-432B-8DAE-1953F412C126}" type="datetimeFigureOut">
               <a:rPr lang="en-US" dirty="0"/>
-              <a:t>8/26/2019</a:t>
+              <a:t>8/30/2019</a:t>
             </a:fld>
             <a:endParaRPr lang="en-US" dirty="0"/>
           </a:p>
@@ -12239,7 +12382,7 @@
           <a:p>
             <a:fld id="{48A87A34-81AB-432B-8DAE-1953F412C126}" type="datetimeFigureOut">
               <a:rPr lang="en-US" dirty="0"/>
-              <a:t>8/26/2019</a:t>
+              <a:t>8/30/2019</a:t>
             </a:fld>
             <a:endParaRPr lang="en-US" dirty="0"/>
           </a:p>
@@ -12497,7 +12640,7 @@
           <a:p>
             <a:fld id="{48A87A34-81AB-432B-8DAE-1953F412C126}" type="datetimeFigureOut">
               <a:rPr lang="en-US" dirty="0"/>
-              <a:t>8/26/2019</a:t>
+              <a:t>8/30/2019</a:t>
             </a:fld>
             <a:endParaRPr lang="en-US" dirty="0"/>
           </a:p>
@@ -12926,7 +13069,7 @@
           <a:p>
             <a:fld id="{48A87A34-81AB-432B-8DAE-1953F412C126}" type="datetimeFigureOut">
               <a:rPr lang="en-US" dirty="0"/>
-              <a:t>8/26/2019</a:t>
+              <a:t>8/30/2019</a:t>
             </a:fld>
             <a:endParaRPr lang="en-US" dirty="0"/>
           </a:p>
@@ -13467,7 +13610,7 @@
           <a:p>
             <a:fld id="{48A87A34-81AB-432B-8DAE-1953F412C126}" type="datetimeFigureOut">
               <a:rPr lang="en-US" dirty="0"/>
-              <a:t>8/26/2019</a:t>
+              <a:t>8/30/2019</a:t>
             </a:fld>
             <a:endParaRPr lang="en-US" dirty="0"/>
           </a:p>
@@ -14182,7 +14325,7 @@
           <a:p>
             <a:fld id="{48A87A34-81AB-432B-8DAE-1953F412C126}" type="datetimeFigureOut">
               <a:rPr lang="en-US" dirty="0"/>
-              <a:t>8/26/2019</a:t>
+              <a:t>8/30/2019</a:t>
             </a:fld>
             <a:endParaRPr lang="en-US" dirty="0"/>
           </a:p>
@@ -14347,7 +14490,7 @@
           <a:p>
             <a:fld id="{48A87A34-81AB-432B-8DAE-1953F412C126}" type="datetimeFigureOut">
               <a:rPr lang="en-US" dirty="0"/>
-              <a:t>8/26/2019</a:t>
+              <a:t>8/30/2019</a:t>
             </a:fld>
             <a:endParaRPr lang="en-US" dirty="0"/>
           </a:p>
@@ -14522,7 +14665,7 @@
           <a:p>
             <a:fld id="{48A87A34-81AB-432B-8DAE-1953F412C126}" type="datetimeFigureOut">
               <a:rPr lang="en-US" dirty="0"/>
-              <a:t>8/26/2019</a:t>
+              <a:t>8/30/2019</a:t>
             </a:fld>
             <a:endParaRPr lang="en-US" dirty="0"/>
           </a:p>
@@ -14687,7 +14830,7 @@
           <a:p>
             <a:fld id="{48A87A34-81AB-432B-8DAE-1953F412C126}" type="datetimeFigureOut">
               <a:rPr lang="en-US" dirty="0"/>
-              <a:t>8/26/2019</a:t>
+              <a:t>8/30/2019</a:t>
             </a:fld>
             <a:endParaRPr lang="en-US" dirty="0"/>
           </a:p>
@@ -14932,7 +15075,7 @@
           <a:p>
             <a:fld id="{48A87A34-81AB-432B-8DAE-1953F412C126}" type="datetimeFigureOut">
               <a:rPr lang="en-US" dirty="0"/>
-              <a:t>8/26/2019</a:t>
+              <a:t>8/30/2019</a:t>
             </a:fld>
             <a:endParaRPr lang="en-US" dirty="0"/>
           </a:p>
@@ -15159,7 +15302,7 @@
           <a:p>
             <a:fld id="{48A87A34-81AB-432B-8DAE-1953F412C126}" type="datetimeFigureOut">
               <a:rPr lang="en-US" dirty="0"/>
-              <a:t>8/26/2019</a:t>
+              <a:t>8/30/2019</a:t>
             </a:fld>
             <a:endParaRPr lang="en-US" dirty="0"/>
           </a:p>
@@ -15535,7 +15678,7 @@
           <a:p>
             <a:fld id="{48A87A34-81AB-432B-8DAE-1953F412C126}" type="datetimeFigureOut">
               <a:rPr lang="en-US" dirty="0"/>
-              <a:t>8/26/2019</a:t>
+              <a:t>8/30/2019</a:t>
             </a:fld>
             <a:endParaRPr lang="en-US" dirty="0"/>
           </a:p>
@@ -15648,7 +15791,7 @@
           <a:p>
             <a:fld id="{48A87A34-81AB-432B-8DAE-1953F412C126}" type="datetimeFigureOut">
               <a:rPr lang="en-US" dirty="0"/>
-              <a:t>8/26/2019</a:t>
+              <a:t>8/30/2019</a:t>
             </a:fld>
             <a:endParaRPr lang="en-US" dirty="0"/>
           </a:p>
@@ -15738,7 +15881,7 @@
           <a:p>
             <a:fld id="{48A87A34-81AB-432B-8DAE-1953F412C126}" type="datetimeFigureOut">
               <a:rPr lang="en-US" dirty="0"/>
-              <a:t>8/26/2019</a:t>
+              <a:t>8/30/2019</a:t>
             </a:fld>
             <a:endParaRPr lang="en-US" dirty="0"/>
           </a:p>
@@ -15982,7 +16125,7 @@
           <a:p>
             <a:fld id="{48A87A34-81AB-432B-8DAE-1953F412C126}" type="datetimeFigureOut">
               <a:rPr lang="en-US" dirty="0"/>
-              <a:t>8/26/2019</a:t>
+              <a:t>8/30/2019</a:t>
             </a:fld>
             <a:endParaRPr lang="en-US" dirty="0"/>
           </a:p>
@@ -16257,7 +16400,7 @@
           <a:p>
             <a:fld id="{48A87A34-81AB-432B-8DAE-1953F412C126}" type="datetimeFigureOut">
               <a:rPr lang="en-US" dirty="0"/>
-              <a:t>8/26/2019</a:t>
+              <a:t>8/30/2019</a:t>
             </a:fld>
             <a:endParaRPr lang="en-US" dirty="0"/>
           </a:p>
@@ -16368,7 +16511,7 @@
           <a:noFill/>
           <a:extLst>
             <a:ext uri="{909E8E84-426E-40dd-AFC4-6F175D3DCCD1}">
-              <a14:hiddenFill xmlns:a14="http://schemas.microsoft.com/office/drawing/2010/main" xmlns="">
+              <a14:hiddenFill xmlns="" xmlns:a14="http://schemas.microsoft.com/office/drawing/2010/main">
                 <a:solidFill>
                   <a:srgbClr val="FFFFFF"/>
                 </a:solidFill>
@@ -16442,7 +16585,7 @@
               </a:ln>
               <a:extLst>
                 <a:ext uri="{91240B29-F687-4f45-9708-019B960494DF}">
-                  <a14:hiddenLine xmlns:a14="http://schemas.microsoft.com/office/drawing/2010/main" xmlns="" w="9525">
+                  <a14:hiddenLine xmlns="" xmlns:a14="http://schemas.microsoft.com/office/drawing/2010/main" w="9525">
                     <a:solidFill>
                       <a:srgbClr val="000000"/>
                     </a:solidFill>
@@ -16532,7 +16675,7 @@
               </a:ln>
               <a:extLst>
                 <a:ext uri="{91240B29-F687-4f45-9708-019B960494DF}">
-                  <a14:hiddenLine xmlns:a14="http://schemas.microsoft.com/office/drawing/2010/main" xmlns="" w="9525">
+                  <a14:hiddenLine xmlns="" xmlns:a14="http://schemas.microsoft.com/office/drawing/2010/main" w="9525">
                     <a:solidFill>
                       <a:srgbClr val="000000"/>
                     </a:solidFill>
@@ -16622,7 +16765,7 @@
               </a:ln>
               <a:extLst>
                 <a:ext uri="{91240B29-F687-4f45-9708-019B960494DF}">
-                  <a14:hiddenLine xmlns:a14="http://schemas.microsoft.com/office/drawing/2010/main" xmlns="" w="9525">
+                  <a14:hiddenLine xmlns="" xmlns:a14="http://schemas.microsoft.com/office/drawing/2010/main" w="9525">
                     <a:solidFill>
                       <a:srgbClr val="000000"/>
                     </a:solidFill>
@@ -16684,7 +16827,7 @@
               </a:ln>
               <a:extLst>
                 <a:ext uri="{91240B29-F687-4f45-9708-019B960494DF}">
-                  <a14:hiddenLine xmlns:a14="http://schemas.microsoft.com/office/drawing/2010/main" xmlns="" w="9525">
+                  <a14:hiddenLine xmlns="" xmlns:a14="http://schemas.microsoft.com/office/drawing/2010/main" w="9525">
                     <a:solidFill>
                       <a:srgbClr val="000000"/>
                     </a:solidFill>
@@ -16774,7 +16917,7 @@
               </a:ln>
               <a:extLst>
                 <a:ext uri="{91240B29-F687-4f45-9708-019B960494DF}">
-                  <a14:hiddenLine xmlns:a14="http://schemas.microsoft.com/office/drawing/2010/main" xmlns="" w="9525">
+                  <a14:hiddenLine xmlns="" xmlns:a14="http://schemas.microsoft.com/office/drawing/2010/main" w="9525">
                     <a:solidFill>
                       <a:srgbClr val="000000"/>
                     </a:solidFill>
@@ -16836,7 +16979,7 @@
               </a:ln>
               <a:extLst>
                 <a:ext uri="{91240B29-F687-4f45-9708-019B960494DF}">
-                  <a14:hiddenLine xmlns:a14="http://schemas.microsoft.com/office/drawing/2010/main" xmlns="" w="9525">
+                  <a14:hiddenLine xmlns="" xmlns:a14="http://schemas.microsoft.com/office/drawing/2010/main" w="9525">
                     <a:solidFill>
                       <a:srgbClr val="000000"/>
                     </a:solidFill>
@@ -16898,7 +17041,7 @@
               </a:ln>
               <a:extLst>
                 <a:ext uri="{91240B29-F687-4f45-9708-019B960494DF}">
-                  <a14:hiddenLine xmlns:a14="http://schemas.microsoft.com/office/drawing/2010/main" xmlns="" w="9525">
+                  <a14:hiddenLine xmlns="" xmlns:a14="http://schemas.microsoft.com/office/drawing/2010/main" w="9525">
                     <a:solidFill>
                       <a:srgbClr val="000000"/>
                     </a:solidFill>
@@ -16988,7 +17131,7 @@
               </a:ln>
               <a:extLst>
                 <a:ext uri="{91240B29-F687-4f45-9708-019B960494DF}">
-                  <a14:hiddenLine xmlns:a14="http://schemas.microsoft.com/office/drawing/2010/main" xmlns="" w="9525">
+                  <a14:hiddenLine xmlns="" xmlns:a14="http://schemas.microsoft.com/office/drawing/2010/main" w="9525">
                     <a:solidFill>
                       <a:srgbClr val="000000"/>
                     </a:solidFill>
@@ -17078,7 +17221,7 @@
               </a:ln>
               <a:extLst>
                 <a:ext uri="{91240B29-F687-4f45-9708-019B960494DF}">
-                  <a14:hiddenLine xmlns:a14="http://schemas.microsoft.com/office/drawing/2010/main" xmlns="" w="9525">
+                  <a14:hiddenLine xmlns="" xmlns:a14="http://schemas.microsoft.com/office/drawing/2010/main" w="9525">
                     <a:solidFill>
                       <a:srgbClr val="000000"/>
                     </a:solidFill>
@@ -17140,7 +17283,7 @@
               </a:ln>
               <a:extLst>
                 <a:ext uri="{91240B29-F687-4f45-9708-019B960494DF}">
-                  <a14:hiddenLine xmlns:a14="http://schemas.microsoft.com/office/drawing/2010/main" xmlns="" w="9525">
+                  <a14:hiddenLine xmlns="" xmlns:a14="http://schemas.microsoft.com/office/drawing/2010/main" w="9525">
                     <a:solidFill>
                       <a:srgbClr val="000000"/>
                     </a:solidFill>
@@ -17250,7 +17393,7 @@
               </a:ln>
               <a:extLst>
                 <a:ext uri="{91240B29-F687-4f45-9708-019B960494DF}">
-                  <a14:hiddenLine xmlns:a14="http://schemas.microsoft.com/office/drawing/2010/main" xmlns="" w="9525">
+                  <a14:hiddenLine xmlns="" xmlns:a14="http://schemas.microsoft.com/office/drawing/2010/main" w="9525">
                     <a:solidFill>
                       <a:srgbClr val="000000"/>
                     </a:solidFill>
@@ -17334,7 +17477,7 @@
               </a:ln>
               <a:extLst>
                 <a:ext uri="{91240B29-F687-4f45-9708-019B960494DF}">
-                  <a14:hiddenLine xmlns:a14="http://schemas.microsoft.com/office/drawing/2010/main" xmlns="" w="9525">
+                  <a14:hiddenLine xmlns="" xmlns:a14="http://schemas.microsoft.com/office/drawing/2010/main" w="9525">
                     <a:solidFill>
                       <a:srgbClr val="000000"/>
                     </a:solidFill>
@@ -17396,7 +17539,7 @@
               </a:ln>
               <a:extLst>
                 <a:ext uri="{91240B29-F687-4f45-9708-019B960494DF}">
-                  <a14:hiddenLine xmlns:a14="http://schemas.microsoft.com/office/drawing/2010/main" xmlns="" w="9525">
+                  <a14:hiddenLine xmlns="" xmlns:a14="http://schemas.microsoft.com/office/drawing/2010/main" w="9525">
                     <a:solidFill>
                       <a:srgbClr val="000000"/>
                     </a:solidFill>
@@ -17458,7 +17601,7 @@
               </a:ln>
               <a:extLst>
                 <a:ext uri="{91240B29-F687-4f45-9708-019B960494DF}">
-                  <a14:hiddenLine xmlns:a14="http://schemas.microsoft.com/office/drawing/2010/main" xmlns="" w="9525">
+                  <a14:hiddenLine xmlns="" xmlns:a14="http://schemas.microsoft.com/office/drawing/2010/main" w="9525">
                     <a:solidFill>
                       <a:srgbClr val="000000"/>
                     </a:solidFill>
@@ -17548,7 +17691,7 @@
               </a:ln>
               <a:extLst>
                 <a:ext uri="{91240B29-F687-4f45-9708-019B960494DF}">
-                  <a14:hiddenLine xmlns:a14="http://schemas.microsoft.com/office/drawing/2010/main" xmlns="" w="9525">
+                  <a14:hiddenLine xmlns="" xmlns:a14="http://schemas.microsoft.com/office/drawing/2010/main" w="9525">
                     <a:solidFill>
                       <a:srgbClr val="000000"/>
                     </a:solidFill>
@@ -17582,7 +17725,7 @@
               </a:ln>
               <a:extLst>
                 <a:ext uri="{91240B29-F687-4f45-9708-019B960494DF}">
-                  <a14:hiddenLine xmlns:a14="http://schemas.microsoft.com/office/drawing/2010/main" xmlns="" w="9525">
+                  <a14:hiddenLine xmlns="" xmlns:a14="http://schemas.microsoft.com/office/drawing/2010/main" w="9525">
                     <a:solidFill>
                       <a:srgbClr val="000000"/>
                     </a:solidFill>
@@ -17647,7 +17790,7 @@
               </a:ln>
               <a:extLst>
                 <a:ext uri="{91240B29-F687-4f45-9708-019B960494DF}">
-                  <a14:hiddenLine xmlns:a14="http://schemas.microsoft.com/office/drawing/2010/main" xmlns="" w="9525">
+                  <a14:hiddenLine xmlns="" xmlns:a14="http://schemas.microsoft.com/office/drawing/2010/main" w="9525">
                     <a:solidFill>
                       <a:srgbClr val="000000"/>
                     </a:solidFill>
@@ -17737,7 +17880,7 @@
               </a:ln>
               <a:extLst>
                 <a:ext uri="{91240B29-F687-4f45-9708-019B960494DF}">
-                  <a14:hiddenLine xmlns:a14="http://schemas.microsoft.com/office/drawing/2010/main" xmlns="" w="9525">
+                  <a14:hiddenLine xmlns="" xmlns:a14="http://schemas.microsoft.com/office/drawing/2010/main" w="9525">
                     <a:solidFill>
                       <a:srgbClr val="000000"/>
                     </a:solidFill>
@@ -17799,7 +17942,7 @@
               </a:ln>
               <a:extLst>
                 <a:ext uri="{91240B29-F687-4f45-9708-019B960494DF}">
-                  <a14:hiddenLine xmlns:a14="http://schemas.microsoft.com/office/drawing/2010/main" xmlns="" w="9525">
+                  <a14:hiddenLine xmlns="" xmlns:a14="http://schemas.microsoft.com/office/drawing/2010/main" w="9525">
                     <a:solidFill>
                       <a:srgbClr val="000000"/>
                     </a:solidFill>
@@ -17889,7 +18032,7 @@
               </a:ln>
               <a:extLst>
                 <a:ext uri="{91240B29-F687-4f45-9708-019B960494DF}">
-                  <a14:hiddenLine xmlns:a14="http://schemas.microsoft.com/office/drawing/2010/main" xmlns="" w="9525">
+                  <a14:hiddenLine xmlns="" xmlns:a14="http://schemas.microsoft.com/office/drawing/2010/main" w="9525">
                     <a:solidFill>
                       <a:srgbClr val="000000"/>
                     </a:solidFill>
@@ -17954,7 +18097,7 @@
               </a:ln>
               <a:extLst>
                 <a:ext uri="{91240B29-F687-4f45-9708-019B960494DF}">
-                  <a14:hiddenLine xmlns:a14="http://schemas.microsoft.com/office/drawing/2010/main" xmlns="" w="9525">
+                  <a14:hiddenLine xmlns="" xmlns:a14="http://schemas.microsoft.com/office/drawing/2010/main" w="9525">
                     <a:solidFill>
                       <a:srgbClr val="000000"/>
                     </a:solidFill>
@@ -18016,7 +18159,7 @@
               </a:ln>
               <a:extLst>
                 <a:ext uri="{91240B29-F687-4f45-9708-019B960494DF}">
-                  <a14:hiddenLine xmlns:a14="http://schemas.microsoft.com/office/drawing/2010/main" xmlns="" w="9525">
+                  <a14:hiddenLine xmlns="" xmlns:a14="http://schemas.microsoft.com/office/drawing/2010/main" w="9525">
                     <a:solidFill>
                       <a:srgbClr val="000000"/>
                     </a:solidFill>
@@ -18106,7 +18249,7 @@
               </a:ln>
               <a:extLst>
                 <a:ext uri="{91240B29-F687-4f45-9708-019B960494DF}">
-                  <a14:hiddenLine xmlns:a14="http://schemas.microsoft.com/office/drawing/2010/main" xmlns="" w="9525">
+                  <a14:hiddenLine xmlns="" xmlns:a14="http://schemas.microsoft.com/office/drawing/2010/main" w="9525">
                     <a:solidFill>
                       <a:srgbClr val="000000"/>
                     </a:solidFill>
@@ -18196,7 +18339,7 @@
               </a:ln>
               <a:extLst>
                 <a:ext uri="{91240B29-F687-4f45-9708-019B960494DF}">
-                  <a14:hiddenLine xmlns:a14="http://schemas.microsoft.com/office/drawing/2010/main" xmlns="" w="9525">
+                  <a14:hiddenLine xmlns="" xmlns:a14="http://schemas.microsoft.com/office/drawing/2010/main" w="9525">
                     <a:solidFill>
                       <a:srgbClr val="000000"/>
                     </a:solidFill>
@@ -18261,7 +18404,7 @@
               </a:ln>
               <a:extLst>
                 <a:ext uri="{91240B29-F687-4f45-9708-019B960494DF}">
-                  <a14:hiddenLine xmlns:a14="http://schemas.microsoft.com/office/drawing/2010/main" xmlns="" w="9525">
+                  <a14:hiddenLine xmlns="" xmlns:a14="http://schemas.microsoft.com/office/drawing/2010/main" w="9525">
                     <a:solidFill>
                       <a:srgbClr val="000000"/>
                     </a:solidFill>
@@ -18381,7 +18524,7 @@
               </a:ln>
               <a:extLst>
                 <a:ext uri="{91240B29-F687-4f45-9708-019B960494DF}">
-                  <a14:hiddenLine xmlns:a14="http://schemas.microsoft.com/office/drawing/2010/main" xmlns="" w="9525">
+                  <a14:hiddenLine xmlns="" xmlns:a14="http://schemas.microsoft.com/office/drawing/2010/main" w="9525">
                     <a:solidFill>
                       <a:srgbClr val="000000"/>
                     </a:solidFill>
@@ -18479,7 +18622,7 @@
               </a:ln>
               <a:extLst>
                 <a:ext uri="{91240B29-F687-4f45-9708-019B960494DF}">
-                  <a14:hiddenLine xmlns:a14="http://schemas.microsoft.com/office/drawing/2010/main" xmlns="" w="9525">
+                  <a14:hiddenLine xmlns="" xmlns:a14="http://schemas.microsoft.com/office/drawing/2010/main" w="9525">
                     <a:solidFill>
                       <a:srgbClr val="000000"/>
                     </a:solidFill>
@@ -18594,7 +18737,7 @@
               </a:ln>
               <a:extLst>
                 <a:ext uri="{91240B29-F687-4f45-9708-019B960494DF}">
-                  <a14:hiddenLine xmlns:a14="http://schemas.microsoft.com/office/drawing/2010/main" xmlns="" w="9525">
+                  <a14:hiddenLine xmlns="" xmlns:a14="http://schemas.microsoft.com/office/drawing/2010/main" w="9525">
                     <a:solidFill>
                       <a:srgbClr val="000000"/>
                     </a:solidFill>
@@ -18684,7 +18827,7 @@
               </a:ln>
               <a:extLst>
                 <a:ext uri="{91240B29-F687-4f45-9708-019B960494DF}">
-                  <a14:hiddenLine xmlns:a14="http://schemas.microsoft.com/office/drawing/2010/main" xmlns="" w="9525">
+                  <a14:hiddenLine xmlns="" xmlns:a14="http://schemas.microsoft.com/office/drawing/2010/main" w="9525">
                     <a:solidFill>
                       <a:srgbClr val="000000"/>
                     </a:solidFill>
@@ -18749,7 +18892,7 @@
               </a:ln>
               <a:extLst>
                 <a:ext uri="{91240B29-F687-4f45-9708-019B960494DF}">
-                  <a14:hiddenLine xmlns:a14="http://schemas.microsoft.com/office/drawing/2010/main" xmlns="" w="9525">
+                  <a14:hiddenLine xmlns="" xmlns:a14="http://schemas.microsoft.com/office/drawing/2010/main" w="9525">
                     <a:solidFill>
                       <a:srgbClr val="000000"/>
                     </a:solidFill>
@@ -18839,7 +18982,7 @@
               </a:ln>
               <a:extLst>
                 <a:ext uri="{91240B29-F687-4f45-9708-019B960494DF}">
-                  <a14:hiddenLine xmlns:a14="http://schemas.microsoft.com/office/drawing/2010/main" xmlns="" w="9525">
+                  <a14:hiddenLine xmlns="" xmlns:a14="http://schemas.microsoft.com/office/drawing/2010/main" w="9525">
                     <a:solidFill>
                       <a:srgbClr val="000000"/>
                     </a:solidFill>
@@ -18907,7 +19050,7 @@
               </a:ln>
               <a:extLst>
                 <a:ext uri="{91240B29-F687-4f45-9708-019B960494DF}">
-                  <a14:hiddenLine xmlns:a14="http://schemas.microsoft.com/office/drawing/2010/main" xmlns="" w="9525">
+                  <a14:hiddenLine xmlns="" xmlns:a14="http://schemas.microsoft.com/office/drawing/2010/main" w="9525">
                     <a:solidFill>
                       <a:srgbClr val="000000"/>
                     </a:solidFill>
@@ -18997,7 +19140,7 @@
               </a:ln>
               <a:extLst>
                 <a:ext uri="{91240B29-F687-4f45-9708-019B960494DF}">
-                  <a14:hiddenLine xmlns:a14="http://schemas.microsoft.com/office/drawing/2010/main" xmlns="" w="9525">
+                  <a14:hiddenLine xmlns="" xmlns:a14="http://schemas.microsoft.com/office/drawing/2010/main" w="9525">
                     <a:solidFill>
                       <a:srgbClr val="000000"/>
                     </a:solidFill>
@@ -19065,7 +19208,7 @@
               </a:ln>
               <a:extLst>
                 <a:ext uri="{91240B29-F687-4f45-9708-019B960494DF}">
-                  <a14:hiddenLine xmlns:a14="http://schemas.microsoft.com/office/drawing/2010/main" xmlns="" w="9525">
+                  <a14:hiddenLine xmlns="" xmlns:a14="http://schemas.microsoft.com/office/drawing/2010/main" w="9525">
                     <a:solidFill>
                       <a:srgbClr val="000000"/>
                     </a:solidFill>
@@ -19155,7 +19298,7 @@
               </a:ln>
               <a:extLst>
                 <a:ext uri="{91240B29-F687-4f45-9708-019B960494DF}">
-                  <a14:hiddenLine xmlns:a14="http://schemas.microsoft.com/office/drawing/2010/main" xmlns="" w="9525">
+                  <a14:hiddenLine xmlns="" xmlns:a14="http://schemas.microsoft.com/office/drawing/2010/main" w="9525">
                     <a:solidFill>
                       <a:srgbClr val="000000"/>
                     </a:solidFill>
@@ -19189,7 +19332,7 @@
               </a:ln>
               <a:extLst>
                 <a:ext uri="{91240B29-F687-4f45-9708-019B960494DF}">
-                  <a14:hiddenLine xmlns:a14="http://schemas.microsoft.com/office/drawing/2010/main" xmlns="" w="9525">
+                  <a14:hiddenLine xmlns="" xmlns:a14="http://schemas.microsoft.com/office/drawing/2010/main" w="9525">
                     <a:solidFill>
                       <a:srgbClr val="000000"/>
                     </a:solidFill>
@@ -19330,7 +19473,7 @@
             <a:fld id="{48A87A34-81AB-432B-8DAE-1953F412C126}" type="datetimeFigureOut">
               <a:rPr lang="en-US" dirty="0"/>
               <a:pPr/>
-              <a:t>8/26/2019</a:t>
+              <a:t>8/30/2019</a:t>
             </a:fld>
             <a:endParaRPr lang="en-US" dirty="0"/>
           </a:p>
@@ -19789,7 +19932,12 @@
             <p:ph type="subTitle" idx="1"/>
           </p:nvPr>
         </p:nvSpPr>
-        <p:spPr/>
+        <p:spPr>
+          <a:xfrm>
+            <a:off x="8252511" y="5912752"/>
+            <a:ext cx="3548192" cy="537476"/>
+          </a:xfrm>
+        </p:spPr>
         <p:txBody>
           <a:bodyPr>
             <a:normAutofit/>
@@ -19797,13 +19945,230 @@
           <a:lstStyle/>
           <a:p>
             <a:r>
-              <a:rPr lang="pt-BR" sz="2400" dirty="0" smtClean="0">
+              <a:rPr lang="pt-BR" sz="2400" cap="none" dirty="0" smtClean="0">
+                <a:solidFill>
+                  <a:schemeClr val="bg1"/>
+                </a:solidFill>
+                <a:latin typeface="Arabic Typesetting" panose="03020402040406030203" pitchFamily="66" charset="-78"/>
+                <a:cs typeface="Arabic Typesetting" panose="03020402040406030203" pitchFamily="66" charset="-78"/>
+              </a:rPr>
+              <a:t>Estagiário: Délio de Arruda Almeida</a:t>
+            </a:r>
+          </a:p>
+          <a:p>
+            <a:endParaRPr lang="pt-BR" sz="2400" dirty="0">
+              <a:solidFill>
+                <a:schemeClr val="bg1"/>
+              </a:solidFill>
+            </a:endParaRPr>
+          </a:p>
+        </p:txBody>
+      </p:sp>
+      <p:sp>
+        <p:nvSpPr>
+          <p:cNvPr id="4" name="Subtítulo 2"/>
+          <p:cNvSpPr txBox="1">
+            <a:spLocks/>
+          </p:cNvSpPr>
+          <p:nvPr/>
+        </p:nvSpPr>
+        <p:spPr>
+          <a:xfrm>
+            <a:off x="2028824" y="3754438"/>
+            <a:ext cx="8791575" cy="537476"/>
+          </a:xfrm>
+          <a:prstGeom prst="rect">
+            <a:avLst/>
+          </a:prstGeom>
+        </p:spPr>
+        <p:txBody>
+          <a:bodyPr vert="horz" lIns="91440" tIns="45720" rIns="91440" bIns="45720" rtlCol="0">
+            <a:normAutofit/>
+          </a:bodyPr>
+          <a:lstStyle>
+            <a:lvl1pPr marL="0" indent="0" algn="l" defTabSz="914400" rtl="0" eaLnBrk="1" latinLnBrk="0" hangingPunct="1">
+              <a:lnSpc>
+                <a:spcPct val="120000"/>
+              </a:lnSpc>
+              <a:spcBef>
+                <a:spcPts val="1000"/>
+              </a:spcBef>
+              <a:buSzPct val="125000"/>
+              <a:buFont typeface="Arial" panose="020B0604020202020204" pitchFamily="34" charset="0"/>
+              <a:buNone/>
+              <a:defRPr sz="2000" kern="1200" cap="all" baseline="0">
+                <a:solidFill>
+                  <a:schemeClr val="tx2"/>
+                </a:solidFill>
+                <a:latin typeface="+mn-lt"/>
+                <a:ea typeface="+mn-ea"/>
+                <a:cs typeface="+mn-cs"/>
+              </a:defRPr>
+            </a:lvl1pPr>
+            <a:lvl2pPr marL="457200" indent="0" algn="ctr" defTabSz="914400" rtl="0" eaLnBrk="1" latinLnBrk="0" hangingPunct="1">
+              <a:lnSpc>
+                <a:spcPct val="120000"/>
+              </a:lnSpc>
+              <a:spcBef>
+                <a:spcPts val="500"/>
+              </a:spcBef>
+              <a:buSzPct val="125000"/>
+              <a:buFont typeface="Arial" panose="020B0604020202020204" pitchFamily="34" charset="0"/>
+              <a:buNone/>
+              <a:defRPr sz="2000" kern="1200">
+                <a:solidFill>
+                  <a:schemeClr val="tx1"/>
+                </a:solidFill>
+                <a:latin typeface="+mn-lt"/>
+                <a:ea typeface="+mn-ea"/>
+                <a:cs typeface="+mn-cs"/>
+              </a:defRPr>
+            </a:lvl2pPr>
+            <a:lvl3pPr marL="914400" indent="0" algn="ctr" defTabSz="914400" rtl="0" eaLnBrk="1" latinLnBrk="0" hangingPunct="1">
+              <a:lnSpc>
+                <a:spcPct val="120000"/>
+              </a:lnSpc>
+              <a:spcBef>
+                <a:spcPts val="500"/>
+              </a:spcBef>
+              <a:buSzPct val="125000"/>
+              <a:buFont typeface="Arial" panose="020B0604020202020204" pitchFamily="34" charset="0"/>
+              <a:buNone/>
+              <a:defRPr sz="1800" kern="1200">
+                <a:solidFill>
+                  <a:schemeClr val="tx1"/>
+                </a:solidFill>
+                <a:latin typeface="+mn-lt"/>
+                <a:ea typeface="+mn-ea"/>
+                <a:cs typeface="+mn-cs"/>
+              </a:defRPr>
+            </a:lvl3pPr>
+            <a:lvl4pPr marL="1371600" indent="0" algn="ctr" defTabSz="914400" rtl="0" eaLnBrk="1" latinLnBrk="0" hangingPunct="1">
+              <a:lnSpc>
+                <a:spcPct val="120000"/>
+              </a:lnSpc>
+              <a:spcBef>
+                <a:spcPts val="500"/>
+              </a:spcBef>
+              <a:buSzPct val="125000"/>
+              <a:buFont typeface="Arial" panose="020B0604020202020204" pitchFamily="34" charset="0"/>
+              <a:buNone/>
+              <a:defRPr sz="1600" kern="1200">
+                <a:solidFill>
+                  <a:schemeClr val="tx1"/>
+                </a:solidFill>
+                <a:latin typeface="+mn-lt"/>
+                <a:ea typeface="+mn-ea"/>
+                <a:cs typeface="+mn-cs"/>
+              </a:defRPr>
+            </a:lvl4pPr>
+            <a:lvl5pPr marL="1828800" indent="0" algn="ctr" defTabSz="914400" rtl="0" eaLnBrk="1" latinLnBrk="0" hangingPunct="1">
+              <a:lnSpc>
+                <a:spcPct val="120000"/>
+              </a:lnSpc>
+              <a:spcBef>
+                <a:spcPts val="500"/>
+              </a:spcBef>
+              <a:buSzPct val="125000"/>
+              <a:buFont typeface="Arial" panose="020B0604020202020204" pitchFamily="34" charset="0"/>
+              <a:buNone/>
+              <a:defRPr sz="1600" kern="1200">
+                <a:solidFill>
+                  <a:schemeClr val="tx1"/>
+                </a:solidFill>
+                <a:latin typeface="+mn-lt"/>
+                <a:ea typeface="+mn-ea"/>
+                <a:cs typeface="+mn-cs"/>
+              </a:defRPr>
+            </a:lvl5pPr>
+            <a:lvl6pPr marL="2286000" indent="0" algn="ctr" defTabSz="914400" rtl="0" eaLnBrk="1" latinLnBrk="0" hangingPunct="1">
+              <a:lnSpc>
+                <a:spcPct val="120000"/>
+              </a:lnSpc>
+              <a:spcBef>
+                <a:spcPts val="500"/>
+              </a:spcBef>
+              <a:buSzPct val="125000"/>
+              <a:buFont typeface="Arial" panose="020B0604020202020204" pitchFamily="34" charset="0"/>
+              <a:buNone/>
+              <a:defRPr sz="1600" kern="1200">
+                <a:solidFill>
+                  <a:schemeClr val="tx1"/>
+                </a:solidFill>
+                <a:latin typeface="+mn-lt"/>
+                <a:ea typeface="+mn-ea"/>
+                <a:cs typeface="+mn-cs"/>
+              </a:defRPr>
+            </a:lvl6pPr>
+            <a:lvl7pPr marL="2743200" indent="0" algn="ctr" defTabSz="914400" rtl="0" eaLnBrk="1" latinLnBrk="0" hangingPunct="1">
+              <a:lnSpc>
+                <a:spcPct val="120000"/>
+              </a:lnSpc>
+              <a:spcBef>
+                <a:spcPts val="500"/>
+              </a:spcBef>
+              <a:buSzPct val="125000"/>
+              <a:buFont typeface="Arial" panose="020B0604020202020204" pitchFamily="34" charset="0"/>
+              <a:buNone/>
+              <a:defRPr sz="1600" kern="1200">
+                <a:solidFill>
+                  <a:schemeClr val="tx1"/>
+                </a:solidFill>
+                <a:latin typeface="+mn-lt"/>
+                <a:ea typeface="+mn-ea"/>
+                <a:cs typeface="+mn-cs"/>
+              </a:defRPr>
+            </a:lvl7pPr>
+            <a:lvl8pPr marL="3200400" indent="0" algn="ctr" defTabSz="914400" rtl="0" eaLnBrk="1" latinLnBrk="0" hangingPunct="1">
+              <a:lnSpc>
+                <a:spcPct val="120000"/>
+              </a:lnSpc>
+              <a:spcBef>
+                <a:spcPts val="500"/>
+              </a:spcBef>
+              <a:buSzPct val="125000"/>
+              <a:buFont typeface="Arial" panose="020B0604020202020204" pitchFamily="34" charset="0"/>
+              <a:buNone/>
+              <a:defRPr sz="1600" kern="1200">
+                <a:solidFill>
+                  <a:schemeClr val="tx1"/>
+                </a:solidFill>
+                <a:latin typeface="+mn-lt"/>
+                <a:ea typeface="+mn-ea"/>
+                <a:cs typeface="+mn-cs"/>
+              </a:defRPr>
+            </a:lvl8pPr>
+            <a:lvl9pPr marL="3657600" indent="0" algn="ctr" defTabSz="914400" rtl="0" eaLnBrk="1" latinLnBrk="0" hangingPunct="1">
+              <a:lnSpc>
+                <a:spcPct val="120000"/>
+              </a:lnSpc>
+              <a:spcBef>
+                <a:spcPts val="500"/>
+              </a:spcBef>
+              <a:buSzPct val="125000"/>
+              <a:buFont typeface="Arial" panose="020B0604020202020204" pitchFamily="34" charset="0"/>
+              <a:buNone/>
+              <a:defRPr sz="1600" kern="1200">
+                <a:solidFill>
+                  <a:schemeClr val="tx1"/>
+                </a:solidFill>
+                <a:latin typeface="+mn-lt"/>
+                <a:ea typeface="+mn-ea"/>
+                <a:cs typeface="+mn-cs"/>
+              </a:defRPr>
+            </a:lvl9pPr>
+          </a:lstStyle>
+          <a:p>
+            <a:r>
+              <a:rPr lang="pt-BR" sz="2400" smtClean="0">
                 <a:solidFill>
                   <a:schemeClr val="bg1"/>
                 </a:solidFill>
               </a:rPr>
-              <a:t>Noções de estatística </a:t>
+              <a:t>Noções de estatística</a:t>
             </a:r>
+          </a:p>
+          <a:p>
             <a:endParaRPr lang="pt-BR" sz="2400" dirty="0">
               <a:solidFill>
                 <a:schemeClr val="bg1"/>
@@ -22066,7 +22431,7 @@
           <p:nvPr>
             <p:extLst>
               <p:ext uri="{D42A27DB-BD31-4B8C-83A1-F6EECF244321}">
-                <p14:modId xmlns:p14="http://schemas.microsoft.com/office/powerpoint/2010/main" val="4053410676"/>
+                <p14:modId xmlns:p14="http://schemas.microsoft.com/office/powerpoint/2010/main" val="2212064852"/>
               </p:ext>
             </p:extLst>
           </p:nvPr>
@@ -22091,7 +22456,7 @@
                     <a:p>
                       <a:pPr algn="l" fontAlgn="ctr"/>
                       <a:r>
-                        <a:rPr lang="pt-BR" sz="1400" b="0" i="0" u="none" strike="noStrike">
+                        <a:rPr lang="pt-BR" sz="1400" b="0" i="0" u="none" strike="noStrike" dirty="0">
                           <a:solidFill>
                             <a:srgbClr val="000000"/>
                           </a:solidFill>
@@ -22323,7 +22688,7 @@
                     <a:bodyPr/>
                     <a:lstStyle/>
                     <a:p>
-                      <a:pPr algn="l" fontAlgn="b"/>
+                      <a:pPr algn="ctr" fontAlgn="b"/>
                       <a:r>
                         <a:rPr lang="pt-BR" sz="1050" b="0" i="0" u="none" strike="noStrike">
                           <a:solidFill>
@@ -22336,7 +22701,7 @@
                       </a:r>
                     </a:p>
                   </a:txBody>
-                  <a:tcPr marL="9525" marR="9525" marT="9525" marB="0" anchor="b">
+                  <a:tcPr marL="9525" marR="9525" marT="9525" marB="0" anchor="ctr">
                     <a:lnL w="6350" cap="flat" cmpd="sng" algn="ctr">
                       <a:solidFill>
                         <a:srgbClr val="000000"/>
@@ -22385,7 +22750,7 @@
                     <a:p>
                       <a:pPr algn="r" fontAlgn="b"/>
                       <a:r>
-                        <a:rPr lang="pt-BR" sz="1400" b="0" i="0" u="none" strike="noStrike">
+                        <a:rPr lang="pt-BR" sz="1400" b="0" i="0" u="none" strike="noStrike" dirty="0">
                           <a:solidFill>
                             <a:srgbClr val="000000"/>
                           </a:solidFill>
@@ -22396,7 +22761,7 @@
                       </a:r>
                     </a:p>
                   </a:txBody>
-                  <a:tcPr marL="9525" marR="9525" marT="9525" marB="0" anchor="b">
+                  <a:tcPr marL="9525" marR="9525" marT="9525" marB="0" anchor="ctr">
                     <a:lnL w="6350" cap="flat" cmpd="sng" algn="ctr">
                       <a:solidFill>
                         <a:srgbClr val="000000"/>
@@ -22445,7 +22810,7 @@
                     <a:bodyPr/>
                     <a:lstStyle/>
                     <a:p>
-                      <a:pPr algn="l" fontAlgn="b"/>
+                      <a:pPr algn="ctr" fontAlgn="b"/>
                       <a:r>
                         <a:rPr lang="pt-BR" sz="1050" b="0" i="0" u="none" strike="noStrike">
                           <a:solidFill>
@@ -22458,7 +22823,7 @@
                       </a:r>
                     </a:p>
                   </a:txBody>
-                  <a:tcPr marL="9525" marR="9525" marT="9525" marB="0" anchor="b">
+                  <a:tcPr marL="9525" marR="9525" marT="9525" marB="0" anchor="ctr">
                     <a:lnL w="6350" cap="flat" cmpd="sng" algn="ctr">
                       <a:solidFill>
                         <a:srgbClr val="000000"/>
@@ -22507,7 +22872,7 @@
                     <a:p>
                       <a:pPr algn="r" fontAlgn="b"/>
                       <a:r>
-                        <a:rPr lang="pt-BR" sz="1400" b="0" i="0" u="none" strike="noStrike">
+                        <a:rPr lang="pt-BR" sz="1400" b="0" i="0" u="none" strike="noStrike" dirty="0">
                           <a:solidFill>
                             <a:srgbClr val="000000"/>
                           </a:solidFill>
@@ -22518,7 +22883,7 @@
                       </a:r>
                     </a:p>
                   </a:txBody>
-                  <a:tcPr marL="9525" marR="9525" marT="9525" marB="0" anchor="b">
+                  <a:tcPr marL="9525" marR="9525" marT="9525" marB="0" anchor="ctr">
                     <a:lnL w="6350" cap="flat" cmpd="sng" algn="ctr">
                       <a:solidFill>
                         <a:srgbClr val="000000"/>
@@ -22567,7 +22932,7 @@
                     <a:bodyPr/>
                     <a:lstStyle/>
                     <a:p>
-                      <a:pPr algn="l" fontAlgn="b"/>
+                      <a:pPr algn="ctr" fontAlgn="b"/>
                       <a:r>
                         <a:rPr lang="pt-BR" sz="1050" b="0" i="0" u="none" strike="noStrike">
                           <a:solidFill>
@@ -22580,7 +22945,7 @@
                       </a:r>
                     </a:p>
                   </a:txBody>
-                  <a:tcPr marL="9525" marR="9525" marT="9525" marB="0" anchor="b">
+                  <a:tcPr marL="9525" marR="9525" marT="9525" marB="0" anchor="ctr">
                     <a:lnL w="6350" cap="flat" cmpd="sng" algn="ctr">
                       <a:solidFill>
                         <a:srgbClr val="000000"/>
@@ -22629,7 +22994,7 @@
                     <a:p>
                       <a:pPr algn="r" fontAlgn="b"/>
                       <a:r>
-                        <a:rPr lang="pt-BR" sz="1400" b="0" i="0" u="none" strike="noStrike">
+                        <a:rPr lang="pt-BR" sz="1400" b="0" i="0" u="none" strike="noStrike" dirty="0">
                           <a:solidFill>
                             <a:srgbClr val="000000"/>
                           </a:solidFill>
@@ -22640,7 +23005,7 @@
                       </a:r>
                     </a:p>
                   </a:txBody>
-                  <a:tcPr marL="9525" marR="9525" marT="9525" marB="0" anchor="b">
+                  <a:tcPr marL="9525" marR="9525" marT="9525" marB="0" anchor="ctr">
                     <a:lnL w="6350" cap="flat" cmpd="sng" algn="ctr">
                       <a:solidFill>
                         <a:srgbClr val="000000"/>
@@ -22689,7 +23054,7 @@
                     <a:bodyPr/>
                     <a:lstStyle/>
                     <a:p>
-                      <a:pPr algn="l" fontAlgn="b"/>
+                      <a:pPr algn="ctr" fontAlgn="b"/>
                       <a:r>
                         <a:rPr lang="pt-BR" sz="1050" b="0" i="0" u="none" strike="noStrike">
                           <a:solidFill>
@@ -22702,7 +23067,7 @@
                       </a:r>
                     </a:p>
                   </a:txBody>
-                  <a:tcPr marL="9525" marR="9525" marT="9525" marB="0" anchor="b">
+                  <a:tcPr marL="9525" marR="9525" marT="9525" marB="0" anchor="ctr">
                     <a:lnL w="6350" cap="flat" cmpd="sng" algn="ctr">
                       <a:solidFill>
                         <a:srgbClr val="000000"/>
@@ -22751,7 +23116,7 @@
                     <a:p>
                       <a:pPr algn="r" fontAlgn="b"/>
                       <a:r>
-                        <a:rPr lang="pt-BR" sz="1400" b="0" i="0" u="none" strike="noStrike">
+                        <a:rPr lang="pt-BR" sz="1400" b="0" i="0" u="none" strike="noStrike" dirty="0">
                           <a:solidFill>
                             <a:srgbClr val="000000"/>
                           </a:solidFill>
@@ -22762,7 +23127,7 @@
                       </a:r>
                     </a:p>
                   </a:txBody>
-                  <a:tcPr marL="9525" marR="9525" marT="9525" marB="0" anchor="b">
+                  <a:tcPr marL="9525" marR="9525" marT="9525" marB="0" anchor="ctr">
                     <a:lnL w="6350" cap="flat" cmpd="sng" algn="ctr">
                       <a:solidFill>
                         <a:srgbClr val="000000"/>
@@ -22811,9 +23176,9 @@
                     <a:bodyPr/>
                     <a:lstStyle/>
                     <a:p>
-                      <a:pPr algn="l" fontAlgn="b"/>
+                      <a:pPr algn="ctr" fontAlgn="b"/>
                       <a:r>
-                        <a:rPr lang="pt-BR" sz="1050" b="0" i="0" u="none" strike="noStrike">
+                        <a:rPr lang="pt-BR" sz="1050" b="0" i="0" u="none" strike="noStrike" dirty="0">
                           <a:solidFill>
                             <a:srgbClr val="333333"/>
                           </a:solidFill>
@@ -22824,7 +23189,7 @@
                       </a:r>
                     </a:p>
                   </a:txBody>
-                  <a:tcPr marL="9525" marR="9525" marT="9525" marB="0" anchor="b">
+                  <a:tcPr marL="9525" marR="9525" marT="9525" marB="0" anchor="ctr">
                     <a:lnL w="6350" cap="flat" cmpd="sng" algn="ctr">
                       <a:solidFill>
                         <a:srgbClr val="000000"/>
@@ -22873,7 +23238,7 @@
                     <a:p>
                       <a:pPr algn="r" fontAlgn="b"/>
                       <a:r>
-                        <a:rPr lang="pt-BR" sz="1400" b="0" i="0" u="none" strike="noStrike">
+                        <a:rPr lang="pt-BR" sz="1400" b="0" i="0" u="none" strike="noStrike" dirty="0">
                           <a:solidFill>
                             <a:srgbClr val="000000"/>
                           </a:solidFill>
@@ -22884,7 +23249,7 @@
                       </a:r>
                     </a:p>
                   </a:txBody>
-                  <a:tcPr marL="9525" marR="9525" marT="9525" marB="0" anchor="b">
+                  <a:tcPr marL="9525" marR="9525" marT="9525" marB="0" anchor="ctr">
                     <a:lnL w="6350" cap="flat" cmpd="sng" algn="ctr">
                       <a:solidFill>
                         <a:srgbClr val="000000"/>
@@ -23006,7 +23371,7 @@
                       </a:r>
                     </a:p>
                   </a:txBody>
-                  <a:tcPr marL="9525" marR="9525" marT="9525" marB="0" anchor="b">
+                  <a:tcPr marL="9525" marR="9525" marT="9525" marB="0" anchor="ctr">
                     <a:lnL w="6350" cap="flat" cmpd="sng" algn="ctr">
                       <a:solidFill>
                         <a:srgbClr val="000000"/>
@@ -23081,6 +23446,441 @@
     <p:extLst>
       <p:ext uri="{BB962C8B-B14F-4D97-AF65-F5344CB8AC3E}">
         <p14:creationId xmlns:p14="http://schemas.microsoft.com/office/powerpoint/2010/main" val="1659490447"/>
+      </p:ext>
+    </p:extLst>
+  </p:cSld>
+  <p:clrMapOvr>
+    <a:masterClrMapping/>
+  </p:clrMapOvr>
+</p:sld>
+</file>
+
+<file path=ppt/slides/slide14.xml><?xml version="1.0" encoding="utf-8"?>
+<p:sld xmlns:a="http://schemas.openxmlformats.org/drawingml/2006/main" xmlns:r="http://schemas.openxmlformats.org/officeDocument/2006/relationships" xmlns:p="http://schemas.openxmlformats.org/presentationml/2006/main">
+  <p:cSld>
+    <p:spTree>
+      <p:nvGrpSpPr>
+        <p:cNvPr id="1" name=""/>
+        <p:cNvGrpSpPr/>
+        <p:nvPr/>
+      </p:nvGrpSpPr>
+      <p:grpSpPr>
+        <a:xfrm>
+          <a:off x="0" y="0"/>
+          <a:ext cx="0" cy="0"/>
+          <a:chOff x="0" y="0"/>
+          <a:chExt cx="0" cy="0"/>
+        </a:xfrm>
+      </p:grpSpPr>
+      <p:sp>
+        <p:nvSpPr>
+          <p:cNvPr id="2" name="Título 1"/>
+          <p:cNvSpPr>
+            <a:spLocks noGrp="1"/>
+          </p:cNvSpPr>
+          <p:nvPr>
+            <p:ph type="title"/>
+          </p:nvPr>
+        </p:nvSpPr>
+        <p:spPr>
+          <a:xfrm>
+            <a:off x="1141413" y="161905"/>
+            <a:ext cx="9905998" cy="1478570"/>
+          </a:xfrm>
+        </p:spPr>
+        <p:txBody>
+          <a:bodyPr/>
+          <a:lstStyle/>
+          <a:p>
+            <a:r>
+              <a:rPr lang="pt-BR" dirty="0" smtClean="0">
+                <a:solidFill>
+                  <a:schemeClr val="bg1"/>
+                </a:solidFill>
+              </a:rPr>
+              <a:t>Funções do </a:t>
+            </a:r>
+            <a:r>
+              <a:rPr lang="pt-BR" dirty="0" err="1" smtClean="0">
+                <a:solidFill>
+                  <a:schemeClr val="bg1"/>
+                </a:solidFill>
+              </a:rPr>
+              <a:t>exel</a:t>
+            </a:r>
+            <a:endParaRPr lang="pt-BR" dirty="0">
+              <a:solidFill>
+                <a:schemeClr val="bg1"/>
+              </a:solidFill>
+            </a:endParaRPr>
+          </a:p>
+        </p:txBody>
+      </p:sp>
+      <p:sp>
+        <p:nvSpPr>
+          <p:cNvPr id="3" name="Espaço Reservado para Conteúdo 2"/>
+          <p:cNvSpPr>
+            <a:spLocks noGrp="1"/>
+          </p:cNvSpPr>
+          <p:nvPr>
+            <p:ph idx="1"/>
+          </p:nvPr>
+        </p:nvSpPr>
+        <p:spPr>
+          <a:xfrm>
+            <a:off x="1141413" y="1348063"/>
+            <a:ext cx="9905999" cy="5312228"/>
+          </a:xfrm>
+        </p:spPr>
+        <p:txBody>
+          <a:bodyPr>
+            <a:normAutofit fontScale="85000" lnSpcReduction="20000"/>
+          </a:bodyPr>
+          <a:lstStyle/>
+          <a:p>
+            <a:pPr marL="0" indent="0">
+              <a:buNone/>
+            </a:pPr>
+            <a:r>
+              <a:rPr lang="pt-BR" b="1" kern="0" dirty="0" smtClean="0">
+                <a:solidFill>
+                  <a:schemeClr val="bg1"/>
+                </a:solidFill>
+                <a:latin typeface="+mj-lt"/>
+                <a:ea typeface="Segoe UI" pitchFamily="34" charset="0"/>
+                <a:cs typeface="Segoe UI" panose="020B0502040204020203" pitchFamily="34" charset="0"/>
+              </a:rPr>
+              <a:t>          SOMA</a:t>
+            </a:r>
+            <a:r>
+              <a:rPr lang="pt-BR" kern="0" dirty="0" smtClean="0">
+                <a:solidFill>
+                  <a:schemeClr val="bg1"/>
+                </a:solidFill>
+                <a:latin typeface="+mj-lt"/>
+                <a:ea typeface="Segoe UI" pitchFamily="34" charset="0"/>
+                <a:cs typeface="Segoe UI" panose="020B0502040204020203" pitchFamily="34" charset="0"/>
+              </a:rPr>
+              <a:t>: Na célula que deseja inserir a soma digite: </a:t>
+            </a:r>
+            <a:r>
+              <a:rPr lang="pt-BR" b="1" kern="0" dirty="0" smtClean="0">
+                <a:solidFill>
+                  <a:schemeClr val="bg1"/>
+                </a:solidFill>
+                <a:latin typeface="+mj-lt"/>
+                <a:ea typeface="Segoe UI" pitchFamily="34" charset="0"/>
+                <a:cs typeface="Segoe UI" panose="020B0502040204020203" pitchFamily="34" charset="0"/>
+              </a:rPr>
+              <a:t>=</a:t>
+            </a:r>
+            <a:r>
+              <a:rPr lang="pt-BR" b="1" kern="0" dirty="0">
+                <a:solidFill>
+                  <a:schemeClr val="bg1"/>
+                </a:solidFill>
+                <a:latin typeface="+mj-lt"/>
+                <a:ea typeface="Segoe UI" pitchFamily="34" charset="0"/>
+                <a:cs typeface="Segoe UI" panose="020B0502040204020203" pitchFamily="34" charset="0"/>
+              </a:rPr>
+              <a:t>SOMA(</a:t>
+            </a:r>
+            <a:r>
+              <a:rPr lang="pt-BR" kern="0" dirty="0">
+                <a:solidFill>
+                  <a:schemeClr val="bg1"/>
+                </a:solidFill>
+                <a:latin typeface="+mj-lt"/>
+                <a:ea typeface="Segoe UI" pitchFamily="34" charset="0"/>
+                <a:cs typeface="Segoe UI" panose="020B0502040204020203" pitchFamily="34" charset="0"/>
+              </a:rPr>
+              <a:t> e selecione o intervalo com o mouse, depois pressione </a:t>
+            </a:r>
+            <a:r>
+              <a:rPr lang="pt-BR" b="1" kern="0" dirty="0" err="1" smtClean="0">
+                <a:solidFill>
+                  <a:schemeClr val="bg1"/>
+                </a:solidFill>
+                <a:latin typeface="+mj-lt"/>
+                <a:ea typeface="Segoe UI" pitchFamily="34" charset="0"/>
+                <a:cs typeface="Segoe UI" panose="020B0502040204020203" pitchFamily="34" charset="0"/>
+              </a:rPr>
+              <a:t>Enter</a:t>
+            </a:r>
+            <a:r>
+              <a:rPr lang="pt-BR" b="1" kern="0" dirty="0" smtClean="0">
+                <a:solidFill>
+                  <a:schemeClr val="bg1"/>
+                </a:solidFill>
+                <a:latin typeface="+mj-lt"/>
+                <a:ea typeface="Segoe UI" pitchFamily="34" charset="0"/>
+                <a:cs typeface="Segoe UI" panose="020B0502040204020203" pitchFamily="34" charset="0"/>
+              </a:rPr>
+              <a:t>)</a:t>
+            </a:r>
+            <a:r>
+              <a:rPr lang="pt-BR" kern="0" dirty="0" smtClean="0">
+                <a:solidFill>
+                  <a:schemeClr val="bg1"/>
+                </a:solidFill>
+                <a:latin typeface="+mj-lt"/>
+                <a:ea typeface="Segoe UI" pitchFamily="34" charset="0"/>
+                <a:cs typeface="Segoe UI" panose="020B0502040204020203" pitchFamily="34" charset="0"/>
+              </a:rPr>
+              <a:t>. </a:t>
+            </a:r>
+          </a:p>
+          <a:p>
+            <a:r>
+              <a:rPr lang="pt-BR" b="1" kern="0" dirty="0" smtClean="0">
+                <a:solidFill>
+                  <a:schemeClr val="bg1"/>
+                </a:solidFill>
+                <a:latin typeface="+mj-lt"/>
+                <a:ea typeface="Segoe UI" pitchFamily="34" charset="0"/>
+                <a:cs typeface="Segoe UI" panose="020B0502040204020203" pitchFamily="34" charset="0"/>
+              </a:rPr>
+              <a:t>=SOMA(D3:D6);</a:t>
+            </a:r>
+          </a:p>
+          <a:p>
+            <a:r>
+              <a:rPr lang="pt-BR" b="1" dirty="0" smtClean="0">
+                <a:solidFill>
+                  <a:srgbClr val="000000"/>
+                </a:solidFill>
+                <a:latin typeface="+mj-lt"/>
+                <a:ea typeface="Times New Roman" panose="02020603050405020304" pitchFamily="18" charset="0"/>
+              </a:rPr>
+              <a:t>=SOMA(D38:D41;H:H)</a:t>
+            </a:r>
+            <a:endParaRPr lang="en-US" b="1" dirty="0">
+              <a:latin typeface="+mj-lt"/>
+              <a:ea typeface="Times New Roman" panose="02020603050405020304" pitchFamily="18" charset="0"/>
+            </a:endParaRPr>
+          </a:p>
+          <a:p>
+            <a:r>
+              <a:rPr lang="pt-BR" b="1" dirty="0" smtClean="0">
+                <a:solidFill>
+                  <a:schemeClr val="bg1"/>
+                </a:solidFill>
+                <a:latin typeface="+mj-lt"/>
+              </a:rPr>
+              <a:t>=</a:t>
+            </a:r>
+            <a:r>
+              <a:rPr lang="pt-BR" b="1" dirty="0">
+                <a:solidFill>
+                  <a:schemeClr val="bg1"/>
+                </a:solidFill>
+                <a:latin typeface="+mj-lt"/>
+              </a:rPr>
+              <a:t>CONT.NÚM(A1:A20</a:t>
+            </a:r>
+            <a:r>
+              <a:rPr lang="pt-BR" b="1" dirty="0" smtClean="0">
+                <a:solidFill>
+                  <a:schemeClr val="bg1"/>
+                </a:solidFill>
+                <a:latin typeface="+mj-lt"/>
+              </a:rPr>
+              <a:t>)</a:t>
+            </a:r>
+          </a:p>
+          <a:p>
+            <a:r>
+              <a:rPr lang="pt-BR" b="1" dirty="0">
+                <a:solidFill>
+                  <a:schemeClr val="bg1"/>
+                </a:solidFill>
+                <a:latin typeface="+mj-lt"/>
+              </a:rPr>
+              <a:t>=CONT.SE(A2:A5;"Londres")</a:t>
+            </a:r>
+          </a:p>
+          <a:p>
+            <a:r>
+              <a:rPr lang="pt-BR" b="1" dirty="0">
+                <a:solidFill>
+                  <a:schemeClr val="bg1"/>
+                </a:solidFill>
+                <a:latin typeface="+mj-lt"/>
+              </a:rPr>
+              <a:t>=CONT.SE(A2:A5;A4</a:t>
+            </a:r>
+            <a:r>
+              <a:rPr lang="pt-BR" b="1" dirty="0" smtClean="0">
+                <a:solidFill>
+                  <a:schemeClr val="bg1"/>
+                </a:solidFill>
+                <a:latin typeface="+mj-lt"/>
+              </a:rPr>
+              <a:t>)</a:t>
+            </a:r>
+          </a:p>
+          <a:p>
+            <a:r>
+              <a:rPr lang="pt-BR" b="1" dirty="0" smtClean="0">
+                <a:solidFill>
+                  <a:schemeClr val="bg1"/>
+                </a:solidFill>
+                <a:latin typeface="+mj-lt"/>
+              </a:rPr>
+              <a:t>=CONT.SES(</a:t>
+            </a:r>
+            <a:endParaRPr lang="pt-BR" b="1" dirty="0">
+              <a:solidFill>
+                <a:schemeClr val="bg1"/>
+              </a:solidFill>
+              <a:latin typeface="+mj-lt"/>
+            </a:endParaRPr>
+          </a:p>
+          <a:p>
+            <a:r>
+              <a:rPr lang="pt-BR" b="1" kern="0" dirty="0" smtClean="0">
+                <a:solidFill>
+                  <a:schemeClr val="bg1"/>
+                </a:solidFill>
+                <a:latin typeface="+mj-lt"/>
+                <a:ea typeface="Segoe UI" pitchFamily="34" charset="0"/>
+                <a:cs typeface="Segoe UI" panose="020B0502040204020203" pitchFamily="34" charset="0"/>
+              </a:rPr>
+              <a:t>=MÉDIA(G3:G6)</a:t>
+            </a:r>
+          </a:p>
+          <a:p>
+            <a:r>
+              <a:rPr lang="pt-BR" b="1" kern="0" dirty="0" smtClean="0">
+                <a:solidFill>
+                  <a:schemeClr val="bg1"/>
+                </a:solidFill>
+                <a:latin typeface="+mj-lt"/>
+                <a:ea typeface="Segoe UI" pitchFamily="34" charset="0"/>
+                <a:cs typeface="Segoe UI" panose="020B0502040204020203" pitchFamily="34" charset="0"/>
+              </a:rPr>
+              <a:t>=MED(A2:A5)</a:t>
+            </a:r>
+          </a:p>
+          <a:p>
+            <a:r>
+              <a:rPr lang="pt-BR" b="1" kern="0" dirty="0" smtClean="0">
+                <a:solidFill>
+                  <a:schemeClr val="bg1"/>
+                </a:solidFill>
+                <a:latin typeface="+mj-lt"/>
+                <a:ea typeface="Segoe UI" pitchFamily="34" charset="0"/>
+                <a:cs typeface="Segoe UI" panose="020B0502040204020203" pitchFamily="34" charset="0"/>
+              </a:rPr>
+              <a:t>=MODO(A2:A5)</a:t>
+            </a:r>
+          </a:p>
+          <a:p>
+            <a:r>
+              <a:rPr lang="pt-BR" b="1" kern="0" dirty="0" smtClean="0">
+                <a:solidFill>
+                  <a:schemeClr val="bg1"/>
+                </a:solidFill>
+                <a:latin typeface="+mj-lt"/>
+                <a:ea typeface="Segoe UI" pitchFamily="34" charset="0"/>
+                <a:cs typeface="Segoe UI" panose="020B0502040204020203" pitchFamily="34" charset="0"/>
+              </a:rPr>
+              <a:t>=FREQÜÊNCIA(A2:G5;P1:P7)</a:t>
+            </a:r>
+          </a:p>
+          <a:p>
+            <a:endParaRPr lang="pt-BR" kern="0" dirty="0" smtClean="0">
+              <a:solidFill>
+                <a:schemeClr val="tx1">
+                  <a:lumMod val="75000"/>
+                  <a:lumOff val="25000"/>
+                </a:schemeClr>
+              </a:solidFill>
+              <a:latin typeface="Segoe UI" panose="020B0502040204020203" pitchFamily="34" charset="0"/>
+              <a:ea typeface="Segoe UI" pitchFamily="34" charset="0"/>
+              <a:cs typeface="Segoe UI" panose="020B0502040204020203" pitchFamily="34" charset="0"/>
+            </a:endParaRPr>
+          </a:p>
+          <a:p>
+            <a:endParaRPr lang="pt-BR" dirty="0"/>
+          </a:p>
+        </p:txBody>
+      </p:sp>
+    </p:spTree>
+    <p:extLst>
+      <p:ext uri="{BB962C8B-B14F-4D97-AF65-F5344CB8AC3E}">
+        <p14:creationId xmlns:p14="http://schemas.microsoft.com/office/powerpoint/2010/main" val="1381251876"/>
+      </p:ext>
+    </p:extLst>
+  </p:cSld>
+  <p:clrMapOvr>
+    <a:masterClrMapping/>
+  </p:clrMapOvr>
+</p:sld>
+</file>
+
+<file path=ppt/slides/slide15.xml><?xml version="1.0" encoding="utf-8"?>
+<p:sld xmlns:a="http://schemas.openxmlformats.org/drawingml/2006/main" xmlns:r="http://schemas.openxmlformats.org/officeDocument/2006/relationships" xmlns:p="http://schemas.openxmlformats.org/presentationml/2006/main">
+  <p:cSld>
+    <p:spTree>
+      <p:nvGrpSpPr>
+        <p:cNvPr id="1" name=""/>
+        <p:cNvGrpSpPr/>
+        <p:nvPr/>
+      </p:nvGrpSpPr>
+      <p:grpSpPr>
+        <a:xfrm>
+          <a:off x="0" y="0"/>
+          <a:ext cx="0" cy="0"/>
+          <a:chOff x="0" y="0"/>
+          <a:chExt cx="0" cy="0"/>
+        </a:xfrm>
+      </p:grpSpPr>
+      <p:sp>
+        <p:nvSpPr>
+          <p:cNvPr id="2" name="Título 1"/>
+          <p:cNvSpPr>
+            <a:spLocks noGrp="1"/>
+          </p:cNvSpPr>
+          <p:nvPr>
+            <p:ph type="title"/>
+          </p:nvPr>
+        </p:nvSpPr>
+        <p:spPr>
+          <a:xfrm>
+            <a:off x="4312508" y="2533816"/>
+            <a:ext cx="2731314" cy="1478570"/>
+          </a:xfrm>
+        </p:spPr>
+        <p:txBody>
+          <a:bodyPr/>
+          <a:lstStyle/>
+          <a:p>
+            <a:pPr algn="ctr"/>
+            <a:r>
+              <a:rPr lang="pt-BR" sz="6000" b="1" cap="none" dirty="0" smtClean="0">
+                <a:solidFill>
+                  <a:schemeClr val="bg1"/>
+                </a:solidFill>
+                <a:latin typeface="Arabic Typesetting" panose="03020402040406030203" pitchFamily="66" charset="-78"/>
+                <a:cs typeface="Arabic Typesetting" panose="03020402040406030203" pitchFamily="66" charset="-78"/>
+              </a:rPr>
+              <a:t>End</a:t>
+            </a:r>
+            <a:endParaRPr lang="pt-BR" sz="6000" b="1" dirty="0">
+              <a:solidFill>
+                <a:schemeClr val="bg1"/>
+              </a:solidFill>
+              <a:latin typeface="Arabic Typesetting" panose="03020402040406030203" pitchFamily="66" charset="-78"/>
+              <a:cs typeface="Arabic Typesetting" panose="03020402040406030203" pitchFamily="66" charset="-78"/>
+            </a:endParaRPr>
+          </a:p>
+        </p:txBody>
+      </p:sp>
+    </p:spTree>
+    <p:extLst>
+      <p:ext uri="{BB962C8B-B14F-4D97-AF65-F5344CB8AC3E}">
+        <p14:creationId xmlns:p14="http://schemas.microsoft.com/office/powerpoint/2010/main" val="1964098359"/>
       </p:ext>
     </p:extLst>
   </p:cSld>
@@ -23243,11 +24043,6 @@
               </a:rPr>
               <a:t>área do conhecimento.</a:t>
             </a:r>
-            <a:endParaRPr lang="pt-BR" sz="2800" dirty="0">
-              <a:solidFill>
-                <a:schemeClr val="bg1"/>
-              </a:solidFill>
-            </a:endParaRPr>
           </a:p>
         </p:txBody>
       </p:sp>
@@ -23662,7 +24457,7 @@
           <p:nvPr/>
         </p:nvPicPr>
         <p:blipFill>
-          <a:blip r:embed="rId2">
+          <a:blip r:embed="rId3">
             <a:extLst>
               <a:ext uri="{28A0092B-C50C-407E-A947-70E740481C1C}">
                 <a14:useLocalDpi xmlns:a14="http://schemas.microsoft.com/office/drawing/2010/main" val="0"/>
@@ -26725,6 +27520,267 @@
 </a:theme>
 </file>
 
+<file path=ppt/theme/theme2.xml><?xml version="1.0" encoding="utf-8"?>
+<a:theme xmlns:a="http://schemas.openxmlformats.org/drawingml/2006/main" name="Tema do Office">
+  <a:themeElements>
+    <a:clrScheme name="Escritório">
+      <a:dk1>
+        <a:sysClr val="windowText" lastClr="000000"/>
+      </a:dk1>
+      <a:lt1>
+        <a:sysClr val="window" lastClr="FFFFFF"/>
+      </a:lt1>
+      <a:dk2>
+        <a:srgbClr val="44546A"/>
+      </a:dk2>
+      <a:lt2>
+        <a:srgbClr val="E7E6E6"/>
+      </a:lt2>
+      <a:accent1>
+        <a:srgbClr val="5B9BD5"/>
+      </a:accent1>
+      <a:accent2>
+        <a:srgbClr val="ED7D31"/>
+      </a:accent2>
+      <a:accent3>
+        <a:srgbClr val="A5A5A5"/>
+      </a:accent3>
+      <a:accent4>
+        <a:srgbClr val="FFC000"/>
+      </a:accent4>
+      <a:accent5>
+        <a:srgbClr val="4472C4"/>
+      </a:accent5>
+      <a:accent6>
+        <a:srgbClr val="70AD47"/>
+      </a:accent6>
+      <a:hlink>
+        <a:srgbClr val="0563C1"/>
+      </a:hlink>
+      <a:folHlink>
+        <a:srgbClr val="954F72"/>
+      </a:folHlink>
+    </a:clrScheme>
+    <a:fontScheme name="Escritório">
+      <a:majorFont>
+        <a:latin typeface="Calibri Light" panose="020F0302020204030204"/>
+        <a:ea typeface=""/>
+        <a:cs typeface=""/>
+        <a:font script="Jpan" typeface="ＭＳ Ｐゴシック"/>
+        <a:font script="Hang" typeface="맑은 고딕"/>
+        <a:font script="Hans" typeface="宋体"/>
+        <a:font script="Hant" typeface="新細明體"/>
+        <a:font script="Arab" typeface="Times New Roman"/>
+        <a:font script="Hebr" typeface="Times New Roman"/>
+        <a:font script="Thai" typeface="Angsana New"/>
+        <a:font script="Ethi" typeface="Nyala"/>
+        <a:font script="Beng" typeface="Vrinda"/>
+        <a:font script="Gujr" typeface="Shruti"/>
+        <a:font script="Khmr" typeface="MoolBoran"/>
+        <a:font script="Knda" typeface="Tunga"/>
+        <a:font script="Guru" typeface="Raavi"/>
+        <a:font script="Cans" typeface="Euphemia"/>
+        <a:font script="Cher" typeface="Plantagenet Cherokee"/>
+        <a:font script="Yiii" typeface="Microsoft Yi Baiti"/>
+        <a:font script="Tibt" typeface="Microsoft Himalaya"/>
+        <a:font script="Thaa" typeface="MV Boli"/>
+        <a:font script="Deva" typeface="Mangal"/>
+        <a:font script="Telu" typeface="Gautami"/>
+        <a:font script="Taml" typeface="Latha"/>
+        <a:font script="Syrc" typeface="Estrangelo Edessa"/>
+        <a:font script="Orya" typeface="Kalinga"/>
+        <a:font script="Mlym" typeface="Kartika"/>
+        <a:font script="Laoo" typeface="DokChampa"/>
+        <a:font script="Sinh" typeface="Iskoola Pota"/>
+        <a:font script="Mong" typeface="Mongolian Baiti"/>
+        <a:font script="Viet" typeface="Times New Roman"/>
+        <a:font script="Uigh" typeface="Microsoft Uighur"/>
+        <a:font script="Geor" typeface="Sylfaen"/>
+      </a:majorFont>
+      <a:minorFont>
+        <a:latin typeface="Calibri" panose="020F0502020204030204"/>
+        <a:ea typeface=""/>
+        <a:cs typeface=""/>
+        <a:font script="Jpan" typeface="ＭＳ Ｐゴシック"/>
+        <a:font script="Hang" typeface="맑은 고딕"/>
+        <a:font script="Hans" typeface="宋体"/>
+        <a:font script="Hant" typeface="新細明體"/>
+        <a:font script="Arab" typeface="Arial"/>
+        <a:font script="Hebr" typeface="Arial"/>
+        <a:font script="Thai" typeface="Cordia New"/>
+        <a:font script="Ethi" typeface="Nyala"/>
+        <a:font script="Beng" typeface="Vrinda"/>
+        <a:font script="Gujr" typeface="Shruti"/>
+        <a:font script="Khmr" typeface="DaunPenh"/>
+        <a:font script="Knda" typeface="Tunga"/>
+        <a:font script="Guru" typeface="Raavi"/>
+        <a:font script="Cans" typeface="Euphemia"/>
+        <a:font script="Cher" typeface="Plantagenet Cherokee"/>
+        <a:font script="Yiii" typeface="Microsoft Yi Baiti"/>
+        <a:font script="Tibt" typeface="Microsoft Himalaya"/>
+        <a:font script="Thaa" typeface="MV Boli"/>
+        <a:font script="Deva" typeface="Mangal"/>
+        <a:font script="Telu" typeface="Gautami"/>
+        <a:font script="Taml" typeface="Latha"/>
+        <a:font script="Syrc" typeface="Estrangelo Edessa"/>
+        <a:font script="Orya" typeface="Kalinga"/>
+        <a:font script="Mlym" typeface="Kartika"/>
+        <a:font script="Laoo" typeface="DokChampa"/>
+        <a:font script="Sinh" typeface="Iskoola Pota"/>
+        <a:font script="Mong" typeface="Mongolian Baiti"/>
+        <a:font script="Viet" typeface="Arial"/>
+        <a:font script="Uigh" typeface="Microsoft Uighur"/>
+        <a:font script="Geor" typeface="Sylfaen"/>
+      </a:minorFont>
+    </a:fontScheme>
+    <a:fmtScheme name="Escritório">
+      <a:fillStyleLst>
+        <a:solidFill>
+          <a:schemeClr val="phClr"/>
+        </a:solidFill>
+        <a:gradFill rotWithShape="1">
+          <a:gsLst>
+            <a:gs pos="0">
+              <a:schemeClr val="phClr">
+                <a:lumMod val="110000"/>
+                <a:satMod val="105000"/>
+                <a:tint val="67000"/>
+              </a:schemeClr>
+            </a:gs>
+            <a:gs pos="50000">
+              <a:schemeClr val="phClr">
+                <a:lumMod val="105000"/>
+                <a:satMod val="103000"/>
+                <a:tint val="73000"/>
+              </a:schemeClr>
+            </a:gs>
+            <a:gs pos="100000">
+              <a:schemeClr val="phClr">
+                <a:lumMod val="105000"/>
+                <a:satMod val="109000"/>
+                <a:tint val="81000"/>
+              </a:schemeClr>
+            </a:gs>
+          </a:gsLst>
+          <a:lin ang="5400000" scaled="0"/>
+        </a:gradFill>
+        <a:gradFill rotWithShape="1">
+          <a:gsLst>
+            <a:gs pos="0">
+              <a:schemeClr val="phClr">
+                <a:satMod val="103000"/>
+                <a:lumMod val="102000"/>
+                <a:tint val="94000"/>
+              </a:schemeClr>
+            </a:gs>
+            <a:gs pos="50000">
+              <a:schemeClr val="phClr">
+                <a:satMod val="110000"/>
+                <a:lumMod val="100000"/>
+                <a:shade val="100000"/>
+              </a:schemeClr>
+            </a:gs>
+            <a:gs pos="100000">
+              <a:schemeClr val="phClr">
+                <a:lumMod val="99000"/>
+                <a:satMod val="120000"/>
+                <a:shade val="78000"/>
+              </a:schemeClr>
+            </a:gs>
+          </a:gsLst>
+          <a:lin ang="5400000" scaled="0"/>
+        </a:gradFill>
+      </a:fillStyleLst>
+      <a:lnStyleLst>
+        <a:ln w="6350" cap="flat" cmpd="sng" algn="ctr">
+          <a:solidFill>
+            <a:schemeClr val="phClr"/>
+          </a:solidFill>
+          <a:prstDash val="solid"/>
+          <a:miter lim="800000"/>
+        </a:ln>
+        <a:ln w="12700" cap="flat" cmpd="sng" algn="ctr">
+          <a:solidFill>
+            <a:schemeClr val="phClr"/>
+          </a:solidFill>
+          <a:prstDash val="solid"/>
+          <a:miter lim="800000"/>
+        </a:ln>
+        <a:ln w="19050" cap="flat" cmpd="sng" algn="ctr">
+          <a:solidFill>
+            <a:schemeClr val="phClr"/>
+          </a:solidFill>
+          <a:prstDash val="solid"/>
+          <a:miter lim="800000"/>
+        </a:ln>
+      </a:lnStyleLst>
+      <a:effectStyleLst>
+        <a:effectStyle>
+          <a:effectLst/>
+        </a:effectStyle>
+        <a:effectStyle>
+          <a:effectLst/>
+        </a:effectStyle>
+        <a:effectStyle>
+          <a:effectLst>
+            <a:outerShdw blurRad="57150" dist="19050" dir="5400000" algn="ctr" rotWithShape="0">
+              <a:srgbClr val="000000">
+                <a:alpha val="63000"/>
+              </a:srgbClr>
+            </a:outerShdw>
+          </a:effectLst>
+        </a:effectStyle>
+      </a:effectStyleLst>
+      <a:bgFillStyleLst>
+        <a:solidFill>
+          <a:schemeClr val="phClr"/>
+        </a:solidFill>
+        <a:solidFill>
+          <a:schemeClr val="phClr">
+            <a:tint val="95000"/>
+            <a:satMod val="170000"/>
+          </a:schemeClr>
+        </a:solidFill>
+        <a:gradFill rotWithShape="1">
+          <a:gsLst>
+            <a:gs pos="0">
+              <a:schemeClr val="phClr">
+                <a:tint val="93000"/>
+                <a:satMod val="150000"/>
+                <a:shade val="98000"/>
+                <a:lumMod val="102000"/>
+              </a:schemeClr>
+            </a:gs>
+            <a:gs pos="50000">
+              <a:schemeClr val="phClr">
+                <a:tint val="98000"/>
+                <a:satMod val="130000"/>
+                <a:shade val="90000"/>
+                <a:lumMod val="103000"/>
+              </a:schemeClr>
+            </a:gs>
+            <a:gs pos="100000">
+              <a:schemeClr val="phClr">
+                <a:shade val="63000"/>
+                <a:satMod val="120000"/>
+              </a:schemeClr>
+            </a:gs>
+          </a:gsLst>
+          <a:lin ang="5400000" scaled="0"/>
+        </a:gradFill>
+      </a:bgFillStyleLst>
+    </a:fmtScheme>
+  </a:themeElements>
+  <a:objectDefaults/>
+  <a:extraClrSchemeLst/>
+  <a:extLst>
+    <a:ext uri="{05A4C25C-085E-4340-85A3-A5531E510DB2}">
+      <thm15:themeFamily xmlns:thm15="http://schemas.microsoft.com/office/thememl/2012/main" name="Office Theme" id="{62F939B6-93AF-4DB8-9C6B-D6C7DFDC589F}" vid="{4A3C46E8-61CC-4603-A589-7422A47A8E4A}"/>
+    </a:ext>
+  </a:extLst>
+</a:theme>
+</file>
+
 <file path=ppt/theme/themeOverride1.xml><?xml version="1.0" encoding="utf-8"?>
 <a:themeOverride xmlns:a="http://schemas.openxmlformats.org/drawingml/2006/main">
   <a:clrScheme name="Escritório">

</xml_diff>